<commit_message>
minor updates to lectures 3 and 4
</commit_message>
<xml_diff>
--- a/GenViz_Module3_Lecture.pptx
+++ b/GenViz_Module3_Lecture.pptx
@@ -20,10 +20,10 @@
     <p:sldId id="262" r:id="rId8"/>
     <p:sldId id="263" r:id="rId9"/>
     <p:sldId id="264" r:id="rId10"/>
-    <p:sldId id="265" r:id="rId11"/>
-    <p:sldId id="266" r:id="rId12"/>
-    <p:sldId id="267" r:id="rId13"/>
-    <p:sldId id="268" r:id="rId14"/>
+    <p:sldId id="267" r:id="rId11"/>
+    <p:sldId id="268" r:id="rId12"/>
+    <p:sldId id="277" r:id="rId13"/>
+    <p:sldId id="278" r:id="rId14"/>
     <p:sldId id="269" r:id="rId15"/>
     <p:sldId id="270" r:id="rId16"/>
     <p:sldId id="271" r:id="rId17"/>
@@ -130,7 +130,7 @@
   </p:defaultTextStyle>
   <p:extLst>
     <p:ext uri="{EFAFB233-063F-42B5-8137-9DF3F51BA10A}">
-      <p15:sldGuideLst xmlns="" xmlns:p15="http://schemas.microsoft.com/office/powerpoint/2012/main">
+      <p15:sldGuideLst xmlns:p15="http://schemas.microsoft.com/office/powerpoint/2012/main" xmlns="">
         <p15:guide id="1" orient="horz" pos="2160">
           <p15:clr>
             <a:srgbClr val="A4A3A4"/>
@@ -230,7 +230,7 @@
             <a:fld id="{03643E35-CD80-874A-A3D7-254E954BB753}" type="datetimeFigureOut">
               <a:rPr lang="en-US" smtClean="0"/>
               <a:pPr/>
-              <a:t>8/31/17</a:t>
+              <a:t>9/13/17</a:t>
             </a:fld>
             <a:endParaRPr lang="en-US"/>
           </a:p>
@@ -397,7 +397,7 @@
             <a:fld id="{5C416C15-7665-174C-99B8-5B237ACA6582}" type="datetimeFigureOut">
               <a:rPr lang="en-US" smtClean="0"/>
               <a:pPr/>
-              <a:t>8/31/17</a:t>
+              <a:t>9/13/17</a:t>
             </a:fld>
             <a:endParaRPr lang="en-US"/>
           </a:p>
@@ -3282,7 +3282,7 @@
             </a:r>
             <a:r>
               <a:rPr lang="en-US" dirty="0" err="1" smtClean="0"/>
-              <a:t>cnFreq</a:t>
+              <a:t>cnSpec</a:t>
             </a:r>
             <a:r>
               <a:rPr lang="en-US" dirty="0" smtClean="0"/>
@@ -3316,45 +3316,31 @@
             <a:pPr lvl="1"/>
             <a:r>
               <a:rPr lang="en-US" dirty="0"/>
-              <a:t>Another view displayed from </a:t>
-            </a:r>
-            <a:r>
-              <a:rPr lang="en-US" dirty="0" err="1"/>
-              <a:t>cnSpec</a:t>
-            </a:r>
-            <a:endParaRPr lang="en-US" dirty="0"/>
+              <a:t>Display recurrent copy number alterations</a:t>
+            </a:r>
+          </a:p>
+          <a:p>
+            <a:r>
+              <a:rPr lang="en-US" dirty="0"/>
+              <a:t>Why do we care?</a:t>
+            </a:r>
           </a:p>
           <a:p>
             <a:pPr lvl="1"/>
             <a:r>
               <a:rPr lang="en-US" dirty="0"/>
-              <a:t>Summarize copy number alterations across a cohort</a:t>
-            </a:r>
-          </a:p>
-          <a:p>
-            <a:pPr lvl="1"/>
-            <a:r>
-              <a:rPr lang="en-US" dirty="0"/>
-              <a:t>Plots segmented copy number alterations for a cohort</a:t>
-            </a:r>
-          </a:p>
-          <a:p>
-            <a:r>
-              <a:rPr lang="en-US" dirty="0"/>
-              <a:t>Why do we care?</a:t>
-            </a:r>
-          </a:p>
-          <a:p>
-            <a:pPr lvl="1"/>
-            <a:r>
-              <a:rPr lang="en-US" dirty="0"/>
-              <a:t>Easily view recurrently amplified/deleted regions</a:t>
-            </a:r>
-          </a:p>
-          <a:p>
-            <a:pPr marL="0" indent="0">
-              <a:buNone/>
-            </a:pPr>
+              <a:t>Recognize patterns of amplifications and deletions while </a:t>
+            </a:r>
+            <a:r>
+              <a:rPr lang="en-US" dirty="0" smtClean="0"/>
+              <a:t>maintaining </a:t>
+            </a:r>
+            <a:r>
+              <a:rPr lang="en-US" dirty="0"/>
+              <a:t>sample information</a:t>
+            </a:r>
+          </a:p>
+          <a:p>
             <a:endParaRPr lang="en-US" dirty="0"/>
           </a:p>
         </p:txBody>
@@ -3362,7 +3348,7 @@
     </p:spTree>
     <p:extLst>
       <p:ext uri="{BB962C8B-B14F-4D97-AF65-F5344CB8AC3E}">
-        <p14:creationId xmlns:p14="http://schemas.microsoft.com/office/powerpoint/2010/main" val="2601097845"/>
+        <p14:creationId xmlns:p14="http://schemas.microsoft.com/office/powerpoint/2010/main" val="1989961242"/>
       </p:ext>
     </p:extLst>
   </p:cSld>
@@ -3414,7 +3400,7 @@
             </a:r>
             <a:r>
               <a:rPr lang="en-US" dirty="0" err="1" smtClean="0"/>
-              <a:t>cnFreq</a:t>
+              <a:t>cnSpec</a:t>
             </a:r>
             <a:r>
               <a:rPr lang="en-US" dirty="0" smtClean="0"/>
@@ -3426,7 +3412,7 @@
       </p:sp>
       <p:pic>
         <p:nvPicPr>
-          <p:cNvPr id="6" name="Content Placeholder 5" descr="cnFreq_v1.png"/>
+          <p:cNvPr id="10" name="Content Placeholder 9" descr="cnSpec_v1.png"/>
           <p:cNvPicPr>
             <a:picLocks noGrp="1" noChangeAspect="1"/>
           </p:cNvPicPr>
@@ -3442,7 +3428,7 @@
               </a:ext>
             </a:extLst>
           </a:blip>
-          <a:srcRect t="-38943" b="-38943"/>
+          <a:srcRect t="-9295" b="-9295"/>
           <a:stretch>
             <a:fillRect/>
           </a:stretch>
@@ -3451,21 +3437,22 @@
       </p:pic>
       <p:sp>
         <p:nvSpPr>
-          <p:cNvPr id="8" name="Rectangle 7"/>
-          <p:cNvSpPr/>
+          <p:cNvPr id="11" name="TextBox 10"/>
+          <p:cNvSpPr txBox="1"/>
           <p:nvPr/>
         </p:nvSpPr>
         <p:spPr>
           <a:xfrm>
-            <a:off x="0" y="5859723"/>
-            <a:ext cx="8462385" cy="923330"/>
+            <a:off x="0" y="5964071"/>
+            <a:ext cx="8766091" cy="923330"/>
           </a:xfrm>
           <a:prstGeom prst="rect">
             <a:avLst/>
           </a:prstGeom>
+          <a:noFill/>
         </p:spPr>
         <p:txBody>
-          <a:bodyPr wrap="square">
+          <a:bodyPr wrap="square" rtlCol="0">
             <a:spAutoFit/>
           </a:bodyPr>
           <a:lstStyle/>
@@ -3490,14 +3477,13 @@
               <a:rPr lang="en-US" dirty="0"/>
               <a:t> and chemotherapy-results from the ACOSOG Z1041 (Alliance) trial."</a:t>
             </a:r>
-            <a:endParaRPr lang="en-US" dirty="0"/>
           </a:p>
         </p:txBody>
       </p:sp>
     </p:spTree>
     <p:extLst>
       <p:ext uri="{BB962C8B-B14F-4D97-AF65-F5344CB8AC3E}">
-        <p14:creationId xmlns:p14="http://schemas.microsoft.com/office/powerpoint/2010/main" val="1501349731"/>
+        <p14:creationId xmlns:p14="http://schemas.microsoft.com/office/powerpoint/2010/main" val="1559941324"/>
       </p:ext>
     </p:extLst>
   </p:cSld>
@@ -3549,7 +3535,7 @@
             </a:r>
             <a:r>
               <a:rPr lang="en-US" dirty="0" err="1" smtClean="0"/>
-              <a:t>cnSpec</a:t>
+              <a:t>cnFreq</a:t>
             </a:r>
             <a:r>
               <a:rPr lang="en-US" dirty="0" smtClean="0"/>
@@ -3583,7 +3569,26 @@
             <a:pPr lvl="1"/>
             <a:r>
               <a:rPr lang="en-US" dirty="0"/>
-              <a:t>Display recurrent copy number alterations</a:t>
+              <a:t>Another view displayed from </a:t>
+            </a:r>
+            <a:r>
+              <a:rPr lang="en-US" dirty="0" err="1"/>
+              <a:t>cnSpec</a:t>
+            </a:r>
+            <a:endParaRPr lang="en-US" dirty="0"/>
+          </a:p>
+          <a:p>
+            <a:pPr lvl="1"/>
+            <a:r>
+              <a:rPr lang="en-US" dirty="0"/>
+              <a:t>Summarize copy number alterations across a cohort</a:t>
+            </a:r>
+          </a:p>
+          <a:p>
+            <a:pPr lvl="1"/>
+            <a:r>
+              <a:rPr lang="en-US" dirty="0"/>
+              <a:t>Plots segmented copy number alterations for a cohort</a:t>
             </a:r>
           </a:p>
           <a:p>
@@ -3596,10 +3601,13 @@
             <a:pPr lvl="1"/>
             <a:r>
               <a:rPr lang="en-US" dirty="0"/>
-              <a:t>Recognize patterns of amplifications and deletions while maintaining a sample information</a:t>
-            </a:r>
-          </a:p>
-          <a:p>
+              <a:t>Easily view recurrently amplified/deleted regions</a:t>
+            </a:r>
+          </a:p>
+          <a:p>
+            <a:pPr marL="0" indent="0">
+              <a:buNone/>
+            </a:pPr>
             <a:endParaRPr lang="en-US" dirty="0"/>
           </a:p>
         </p:txBody>
@@ -3607,13 +3615,20 @@
     </p:spTree>
     <p:extLst>
       <p:ext uri="{BB962C8B-B14F-4D97-AF65-F5344CB8AC3E}">
-        <p14:creationId xmlns:p14="http://schemas.microsoft.com/office/powerpoint/2010/main" val="1989961242"/>
+        <p14:creationId xmlns:p14="http://schemas.microsoft.com/office/powerpoint/2010/main" val="1572284135"/>
       </p:ext>
     </p:extLst>
   </p:cSld>
   <p:clrMapOvr>
     <a:masterClrMapping/>
   </p:clrMapOvr>
+  <p:timing>
+    <p:tnLst>
+      <p:par>
+        <p:cTn xmlns:p14="http://schemas.microsoft.com/office/powerpoint/2010/main" id="1" dur="indefinite" restart="never" nodeType="tmRoot"/>
+      </p:par>
+    </p:tnLst>
+  </p:timing>
 </p:sld>
 </file>
 
@@ -3659,7 +3674,7 @@
             </a:r>
             <a:r>
               <a:rPr lang="en-US" dirty="0" err="1" smtClean="0"/>
-              <a:t>cnSpec</a:t>
+              <a:t>cnFreq</a:t>
             </a:r>
             <a:r>
               <a:rPr lang="en-US" dirty="0" smtClean="0"/>
@@ -3671,7 +3686,7 @@
       </p:sp>
       <p:pic>
         <p:nvPicPr>
-          <p:cNvPr id="10" name="Content Placeholder 9" descr="cnSpec_v1.png"/>
+          <p:cNvPr id="6" name="Content Placeholder 5" descr="cnFreq_v1.png"/>
           <p:cNvPicPr>
             <a:picLocks noGrp="1" noChangeAspect="1"/>
           </p:cNvPicPr>
@@ -3687,7 +3702,7 @@
               </a:ext>
             </a:extLst>
           </a:blip>
-          <a:srcRect t="-9295" b="-9295"/>
+          <a:srcRect t="-38943" b="-38943"/>
           <a:stretch>
             <a:fillRect/>
           </a:stretch>
@@ -3696,22 +3711,21 @@
       </p:pic>
       <p:sp>
         <p:nvSpPr>
-          <p:cNvPr id="11" name="TextBox 10"/>
-          <p:cNvSpPr txBox="1"/>
+          <p:cNvPr id="8" name="Rectangle 7"/>
+          <p:cNvSpPr/>
           <p:nvPr/>
         </p:nvSpPr>
         <p:spPr>
           <a:xfrm>
-            <a:off x="0" y="5964071"/>
-            <a:ext cx="8766091" cy="923330"/>
+            <a:off x="0" y="5859723"/>
+            <a:ext cx="8462385" cy="923330"/>
           </a:xfrm>
           <a:prstGeom prst="rect">
             <a:avLst/>
           </a:prstGeom>
-          <a:noFill/>
         </p:spPr>
         <p:txBody>
-          <a:bodyPr wrap="square" rtlCol="0">
+          <a:bodyPr wrap="square">
             <a:spAutoFit/>
           </a:bodyPr>
           <a:lstStyle/>
@@ -3742,13 +3756,20 @@
     </p:spTree>
     <p:extLst>
       <p:ext uri="{BB962C8B-B14F-4D97-AF65-F5344CB8AC3E}">
-        <p14:creationId xmlns:p14="http://schemas.microsoft.com/office/powerpoint/2010/main" val="1559941324"/>
+        <p14:creationId xmlns:p14="http://schemas.microsoft.com/office/powerpoint/2010/main" val="993184315"/>
       </p:ext>
     </p:extLst>
   </p:cSld>
   <p:clrMapOvr>
     <a:masterClrMapping/>
   </p:clrMapOvr>
+  <p:timing>
+    <p:tnLst>
+      <p:par>
+        <p:cTn xmlns:p14="http://schemas.microsoft.com/office/powerpoint/2010/main" id="1" dur="indefinite" restart="never" nodeType="tmRoot"/>
+      </p:par>
+    </p:tnLst>
+  </p:timing>
 </p:sld>
 </file>
 
@@ -3842,8 +3863,13 @@
           <a:p>
             <a:r>
               <a:rPr lang="en-US" dirty="0"/>
-              <a:t>Why we care</a:t>
-            </a:r>
+              <a:t>Why we </a:t>
+            </a:r>
+            <a:r>
+              <a:rPr lang="en-US" dirty="0" smtClean="0"/>
+              <a:t>care?</a:t>
+            </a:r>
+            <a:endParaRPr lang="en-US" dirty="0"/>
           </a:p>
           <a:p>
             <a:pPr lvl="1"/>
@@ -3886,6 +3912,13 @@
   <p:clrMapOvr>
     <a:masterClrMapping/>
   </p:clrMapOvr>
+  <p:timing>
+    <p:tnLst>
+      <p:par>
+        <p:cTn xmlns:p14="http://schemas.microsoft.com/office/powerpoint/2010/main" id="1" dur="indefinite" restart="never" nodeType="tmRoot"/>
+      </p:par>
+    </p:tnLst>
+  </p:timing>
 </p:sld>
 </file>
 
@@ -4096,6 +4129,13 @@
   <p:clrMapOvr>
     <a:masterClrMapping/>
   </p:clrMapOvr>
+  <p:timing>
+    <p:tnLst>
+      <p:par>
+        <p:cTn xmlns:p14="http://schemas.microsoft.com/office/powerpoint/2010/main" id="1" dur="indefinite" restart="never" nodeType="tmRoot"/>
+      </p:par>
+    </p:tnLst>
+  </p:timing>
 </p:sld>
 </file>
 
@@ -4219,6 +4259,13 @@
   <p:clrMapOvr>
     <a:masterClrMapping/>
   </p:clrMapOvr>
+  <p:timing>
+    <p:tnLst>
+      <p:par>
+        <p:cTn xmlns:p14="http://schemas.microsoft.com/office/powerpoint/2010/main" id="1" dur="indefinite" restart="never" nodeType="tmRoot"/>
+      </p:par>
+    </p:tnLst>
+  </p:timing>
 </p:sld>
 </file>
 
@@ -4332,6 +4379,13 @@
   <p:clrMapOvr>
     <a:masterClrMapping/>
   </p:clrMapOvr>
+  <p:timing>
+    <p:tnLst>
+      <p:par>
+        <p:cTn xmlns:p14="http://schemas.microsoft.com/office/powerpoint/2010/main" id="1" dur="indefinite" restart="never" nodeType="tmRoot"/>
+      </p:par>
+    </p:tnLst>
+  </p:timing>
 </p:sld>
 </file>
 
@@ -5064,11 +5118,11 @@
           <a:p>
             <a:r>
               <a:rPr lang="en-US" dirty="0" smtClean="0"/>
-              <a:t> </a:t>
-            </a:r>
-            <a:r>
-              <a:rPr lang="en-US" dirty="0"/>
-              <a:t>The package is built upon </a:t>
+              <a:t>The </a:t>
+            </a:r>
+            <a:r>
+              <a:rPr lang="en-US" dirty="0"/>
+              <a:t>package is built upon </a:t>
             </a:r>
             <a:r>
               <a:rPr lang="en-US" dirty="0" smtClean="0"/>
@@ -5090,7 +5144,15 @@
             </a:r>
             <a:r>
               <a:rPr lang="en-US" dirty="0"/>
-              <a:t>package is intended to be flexible supporting multiple file types, species, etc.</a:t>
+              <a:t>package is intended to be </a:t>
+            </a:r>
+            <a:r>
+              <a:rPr lang="en-US" dirty="0" smtClean="0"/>
+              <a:t>flexible, </a:t>
+            </a:r>
+            <a:r>
+              <a:rPr lang="en-US" dirty="0"/>
+              <a:t>supporting multiple file types, species, etc.</a:t>
             </a:r>
           </a:p>
           <a:p>
@@ -5143,8 +5205,8 @@
               <a:t>package is maintained by the </a:t>
             </a:r>
             <a:r>
-              <a:rPr lang="en-US" dirty="0" err="1"/>
-              <a:t>griffithlab</a:t>
+              <a:rPr lang="en-US" dirty="0" smtClean="0"/>
+              <a:t>Griffith lab.</a:t>
             </a:r>
             <a:endParaRPr lang="en-US" dirty="0"/>
           </a:p>
@@ -5678,7 +5740,7 @@
         <p:spPr>
           <a:xfrm>
             <a:off x="0" y="6136722"/>
-            <a:ext cx="8862786" cy="646331"/>
+            <a:ext cx="8862786" cy="584776"/>
           </a:xfrm>
           <a:prstGeom prst="rect">
             <a:avLst/>
@@ -5692,23 +5754,23 @@
           <a:lstStyle/>
           <a:p>
             <a:r>
-              <a:rPr lang="en-US" dirty="0"/>
+              <a:rPr lang="en-US" sz="1600" dirty="0"/>
               <a:t>This research was originally published in Blood. </a:t>
             </a:r>
             <a:r>
-              <a:rPr lang="en-US" dirty="0" err="1"/>
+              <a:rPr lang="en-US" sz="1600" dirty="0" err="1"/>
               <a:t>Krysiak</a:t>
             </a:r>
             <a:r>
-              <a:rPr lang="en-US" dirty="0"/>
+              <a:rPr lang="en-US" sz="1600" dirty="0"/>
               <a:t> et al. Blood 2017 129:473-483 by </a:t>
             </a:r>
             <a:r>
-              <a:rPr lang="en-US" dirty="0" err="1"/>
+              <a:rPr lang="en-US" sz="1600" dirty="0" err="1"/>
               <a:t>Krysiak</a:t>
             </a:r>
             <a:r>
-              <a:rPr lang="en-US" dirty="0"/>
+              <a:rPr lang="en-US" sz="1600" dirty="0"/>
               <a:t> et al. licensed under © the American Society of Hematology</a:t>
             </a:r>
           </a:p>
@@ -5988,7 +6050,7 @@
   <a:extraClrSchemeLst/>
   <a:extLst>
     <a:ext uri="{05A4C25C-085E-4340-85A3-A5531E510DB2}">
-      <thm15:themeFamily xmlns="" xmlns:thm15="http://schemas.microsoft.com/office/thememl/2012/main" name="MGI_4-3_ratio_v1a" id="{9A0171FA-20F4-F840-B1C8-29D686AB0540}" vid="{60506783-C923-7847-B1CA-7C860CC95497}"/>
+      <thm15:themeFamily xmlns:thm15="http://schemas.microsoft.com/office/thememl/2012/main" xmlns="" name="MGI_4-3_ratio_v1a" id="{9A0171FA-20F4-F840-B1C8-29D686AB0540}" vid="{60506783-C923-7847-B1CA-7C860CC95497}"/>
     </a:ext>
   </a:extLst>
 </a:theme>

</xml_diff>

<commit_message>
minor update to lecture 3
</commit_message>
<xml_diff>
--- a/GenViz_Module3_Lecture.pptx
+++ b/GenViz_Module3_Lecture.pptx
@@ -5,31 +5,32 @@
     <p:sldMasterId id="2147483648" r:id="rId1"/>
   </p:sldMasterIdLst>
   <p:notesMasterIdLst>
-    <p:notesMasterId r:id="rId21"/>
+    <p:notesMasterId r:id="rId22"/>
   </p:notesMasterIdLst>
   <p:handoutMasterIdLst>
-    <p:handoutMasterId r:id="rId22"/>
+    <p:handoutMasterId r:id="rId23"/>
   </p:handoutMasterIdLst>
   <p:sldIdLst>
     <p:sldId id="256" r:id="rId2"/>
-    <p:sldId id="260" r:id="rId3"/>
-    <p:sldId id="257" r:id="rId4"/>
-    <p:sldId id="275" r:id="rId5"/>
-    <p:sldId id="276" r:id="rId6"/>
-    <p:sldId id="261" r:id="rId7"/>
-    <p:sldId id="262" r:id="rId8"/>
-    <p:sldId id="263" r:id="rId9"/>
-    <p:sldId id="264" r:id="rId10"/>
-    <p:sldId id="267" r:id="rId11"/>
-    <p:sldId id="268" r:id="rId12"/>
-    <p:sldId id="277" r:id="rId13"/>
-    <p:sldId id="278" r:id="rId14"/>
-    <p:sldId id="269" r:id="rId15"/>
-    <p:sldId id="270" r:id="rId16"/>
-    <p:sldId id="271" r:id="rId17"/>
-    <p:sldId id="272" r:id="rId18"/>
-    <p:sldId id="273" r:id="rId19"/>
-    <p:sldId id="274" r:id="rId20"/>
+    <p:sldId id="259" r:id="rId3"/>
+    <p:sldId id="260" r:id="rId4"/>
+    <p:sldId id="257" r:id="rId5"/>
+    <p:sldId id="275" r:id="rId6"/>
+    <p:sldId id="276" r:id="rId7"/>
+    <p:sldId id="261" r:id="rId8"/>
+    <p:sldId id="262" r:id="rId9"/>
+    <p:sldId id="263" r:id="rId10"/>
+    <p:sldId id="264" r:id="rId11"/>
+    <p:sldId id="267" r:id="rId12"/>
+    <p:sldId id="268" r:id="rId13"/>
+    <p:sldId id="277" r:id="rId14"/>
+    <p:sldId id="278" r:id="rId15"/>
+    <p:sldId id="269" r:id="rId16"/>
+    <p:sldId id="270" r:id="rId17"/>
+    <p:sldId id="271" r:id="rId18"/>
+    <p:sldId id="272" r:id="rId19"/>
+    <p:sldId id="273" r:id="rId20"/>
+    <p:sldId id="274" r:id="rId21"/>
   </p:sldIdLst>
   <p:sldSz cx="9144000" cy="6858000" type="screen4x3"/>
   <p:notesSz cx="6858000" cy="9144000"/>
@@ -130,7 +131,7 @@
   </p:defaultTextStyle>
   <p:extLst>
     <p:ext uri="{EFAFB233-063F-42B5-8137-9DF3F51BA10A}">
-      <p15:sldGuideLst xmlns:p15="http://schemas.microsoft.com/office/powerpoint/2012/main" xmlns="">
+      <p15:sldGuideLst xmlns:p15="http://schemas.microsoft.com/office/powerpoint/2012/main">
         <p15:guide id="1" orient="horz" pos="2160">
           <p15:clr>
             <a:srgbClr val="A4A3A4"/>
@@ -230,7 +231,7 @@
             <a:fld id="{03643E35-CD80-874A-A3D7-254E954BB753}" type="datetimeFigureOut">
               <a:rPr lang="en-US" smtClean="0"/>
               <a:pPr/>
-              <a:t>9/13/17</a:t>
+              <a:t>4/10/19</a:t>
             </a:fld>
             <a:endParaRPr lang="en-US"/>
           </a:p>
@@ -397,7 +398,7 @@
             <a:fld id="{5C416C15-7665-174C-99B8-5B237ACA6582}" type="datetimeFigureOut">
               <a:rPr lang="en-US" smtClean="0"/>
               <a:pPr/>
-              <a:t>9/13/17</a:t>
+              <a:t>4/10/19</a:t>
             </a:fld>
             <a:endParaRPr lang="en-US"/>
           </a:p>
@@ -463,38 +464,37 @@
           <a:p>
             <a:pPr lvl="0"/>
             <a:r>
-              <a:rPr lang="en-US" smtClean="0"/>
+              <a:rPr lang="en-US"/>
               <a:t>Click to edit Master text styles</a:t>
             </a:r>
           </a:p>
           <a:p>
             <a:pPr lvl="1"/>
             <a:r>
-              <a:rPr lang="en-US" smtClean="0"/>
+              <a:rPr lang="en-US"/>
               <a:t>Second level</a:t>
             </a:r>
           </a:p>
           <a:p>
             <a:pPr lvl="2"/>
             <a:r>
-              <a:rPr lang="en-US" smtClean="0"/>
+              <a:rPr lang="en-US"/>
               <a:t>Third level</a:t>
             </a:r>
           </a:p>
           <a:p>
             <a:pPr lvl="3"/>
             <a:r>
-              <a:rPr lang="en-US" smtClean="0"/>
+              <a:rPr lang="en-US"/>
               <a:t>Fourth level</a:t>
             </a:r>
           </a:p>
           <a:p>
             <a:pPr lvl="4"/>
             <a:r>
-              <a:rPr lang="en-US" smtClean="0"/>
+              <a:rPr lang="en-US"/>
               <a:t>Fifth level</a:t>
             </a:r>
-            <a:endParaRPr lang="en-US"/>
           </a:p>
         </p:txBody>
       </p:sp>
@@ -712,6 +712,70 @@
           <a:bodyPr/>
           <a:lstStyle/>
           <a:p>
+            <a:pPr marL="171450" indent="-171450">
+              <a:buFontTx/>
+              <a:buChar char="•"/>
+            </a:pPr>
+            <a:r>
+              <a:rPr lang="en-US" dirty="0"/>
+              <a:t>Note there</a:t>
+            </a:r>
+            <a:r>
+              <a:rPr lang="en-US" baseline="0" dirty="0"/>
+              <a:t> are two licenses if effect for this course. </a:t>
+            </a:r>
+          </a:p>
+          <a:p>
+            <a:pPr marL="628650" lvl="1" indent="-171450">
+              <a:buFontTx/>
+              <a:buChar char="•"/>
+            </a:pPr>
+            <a:r>
+              <a:rPr lang="en-US" baseline="0" dirty="0"/>
+              <a:t>All *content* (lectures, written materials, etc.) are made available under the Creative Commons Attribution-</a:t>
+            </a:r>
+            <a:r>
+              <a:rPr lang="en-US" baseline="0" dirty="0" err="1"/>
+              <a:t>ShareAlike</a:t>
+            </a:r>
+            <a:r>
+              <a:rPr lang="en-US" baseline="0" dirty="0"/>
+              <a:t> 4.0 International (CC BY-SA 4.0). (https://</a:t>
+            </a:r>
+            <a:r>
+              <a:rPr lang="en-US" baseline="0" dirty="0" err="1"/>
+              <a:t>creativecommons.org</a:t>
+            </a:r>
+            <a:r>
+              <a:rPr lang="en-US" baseline="0" dirty="0"/>
+              <a:t>/licenses/by-</a:t>
+            </a:r>
+            <a:r>
+              <a:rPr lang="en-US" baseline="0" dirty="0" err="1"/>
+              <a:t>sa</a:t>
+            </a:r>
+            <a:r>
+              <a:rPr lang="en-US" baseline="0" dirty="0"/>
+              <a:t>/4.0/).</a:t>
+            </a:r>
+          </a:p>
+          <a:p>
+            <a:pPr marL="628650" lvl="1" indent="-171450">
+              <a:buFontTx/>
+              <a:buChar char="•"/>
+            </a:pPr>
+            <a:r>
+              <a:rPr lang="en-US" baseline="0" dirty="0"/>
+              <a:t>All *code* (R scripts the website code itself) are made available under the MIT License (https://</a:t>
+            </a:r>
+            <a:r>
+              <a:rPr lang="en-US" baseline="0" dirty="0" err="1"/>
+              <a:t>opensource.org</a:t>
+            </a:r>
+            <a:r>
+              <a:rPr lang="en-US" baseline="0" dirty="0"/>
+              <a:t>/licenses/MIT).</a:t>
+            </a:r>
             <a:endParaRPr lang="en-US" dirty="0"/>
           </a:p>
         </p:txBody>
@@ -734,7 +798,7 @@
             <a:fld id="{F9BF1BD6-11A6-594E-AFA1-283323A41F72}" type="slidenum">
               <a:rPr lang="en-US" smtClean="0"/>
               <a:pPr/>
-              <a:t>7</a:t>
+              <a:t>2</a:t>
             </a:fld>
             <a:endParaRPr lang="en-US"/>
           </a:p>
@@ -743,7 +807,7 @@
     </p:spTree>
     <p:extLst>
       <p:ext uri="{BB962C8B-B14F-4D97-AF65-F5344CB8AC3E}">
-        <p14:creationId xmlns:p14="http://schemas.microsoft.com/office/powerpoint/2010/main" val="3509994250"/>
+        <p14:creationId xmlns:p14="http://schemas.microsoft.com/office/powerpoint/2010/main" val="2020203644"/>
       </p:ext>
     </p:extLst>
   </p:cSld>
@@ -819,7 +883,7 @@
             <a:fld id="{F9BF1BD6-11A6-594E-AFA1-283323A41F72}" type="slidenum">
               <a:rPr lang="en-US" smtClean="0"/>
               <a:pPr/>
-              <a:t>9</a:t>
+              <a:t>8</a:t>
             </a:fld>
             <a:endParaRPr lang="en-US"/>
           </a:p>
@@ -828,7 +892,7 @@
     </p:spTree>
     <p:extLst>
       <p:ext uri="{BB962C8B-B14F-4D97-AF65-F5344CB8AC3E}">
-        <p14:creationId xmlns:p14="http://schemas.microsoft.com/office/powerpoint/2010/main" val="1535439783"/>
+        <p14:creationId xmlns:p14="http://schemas.microsoft.com/office/powerpoint/2010/main" val="3509994250"/>
       </p:ext>
     </p:extLst>
   </p:cSld>
@@ -904,7 +968,92 @@
             <a:fld id="{F9BF1BD6-11A6-594E-AFA1-283323A41F72}" type="slidenum">
               <a:rPr lang="en-US" smtClean="0"/>
               <a:pPr/>
-              <a:t>19</a:t>
+              <a:t>10</a:t>
+            </a:fld>
+            <a:endParaRPr lang="en-US"/>
+          </a:p>
+        </p:txBody>
+      </p:sp>
+    </p:spTree>
+    <p:extLst>
+      <p:ext uri="{BB962C8B-B14F-4D97-AF65-F5344CB8AC3E}">
+        <p14:creationId xmlns:p14="http://schemas.microsoft.com/office/powerpoint/2010/main" val="1535439783"/>
+      </p:ext>
+    </p:extLst>
+  </p:cSld>
+  <p:clrMapOvr>
+    <a:masterClrMapping/>
+  </p:clrMapOvr>
+</p:notes>
+</file>
+
+<file path=ppt/notesSlides/notesSlide4.xml><?xml version="1.0" encoding="utf-8"?>
+<p:notes xmlns:a="http://schemas.openxmlformats.org/drawingml/2006/main" xmlns:r="http://schemas.openxmlformats.org/officeDocument/2006/relationships" xmlns:p="http://schemas.openxmlformats.org/presentationml/2006/main">
+  <p:cSld>
+    <p:spTree>
+      <p:nvGrpSpPr>
+        <p:cNvPr id="1" name=""/>
+        <p:cNvGrpSpPr/>
+        <p:nvPr/>
+      </p:nvGrpSpPr>
+      <p:grpSpPr>
+        <a:xfrm>
+          <a:off x="0" y="0"/>
+          <a:ext cx="0" cy="0"/>
+          <a:chOff x="0" y="0"/>
+          <a:chExt cx="0" cy="0"/>
+        </a:xfrm>
+      </p:grpSpPr>
+      <p:sp>
+        <p:nvSpPr>
+          <p:cNvPr id="2" name="Slide Image Placeholder 1"/>
+          <p:cNvSpPr>
+            <a:spLocks noGrp="1" noRot="1" noChangeAspect="1"/>
+          </p:cNvSpPr>
+          <p:nvPr>
+            <p:ph type="sldImg"/>
+          </p:nvPr>
+        </p:nvSpPr>
+        <p:spPr/>
+      </p:sp>
+      <p:sp>
+        <p:nvSpPr>
+          <p:cNvPr id="3" name="Notes Placeholder 2"/>
+          <p:cNvSpPr>
+            <a:spLocks noGrp="1"/>
+          </p:cNvSpPr>
+          <p:nvPr>
+            <p:ph type="body" idx="1"/>
+          </p:nvPr>
+        </p:nvSpPr>
+        <p:spPr/>
+        <p:txBody>
+          <a:bodyPr/>
+          <a:lstStyle/>
+          <a:p>
+            <a:endParaRPr lang="en-US" dirty="0"/>
+          </a:p>
+        </p:txBody>
+      </p:sp>
+      <p:sp>
+        <p:nvSpPr>
+          <p:cNvPr id="4" name="Slide Number Placeholder 3"/>
+          <p:cNvSpPr>
+            <a:spLocks noGrp="1"/>
+          </p:cNvSpPr>
+          <p:nvPr>
+            <p:ph type="sldNum" sz="quarter" idx="10"/>
+          </p:nvPr>
+        </p:nvSpPr>
+        <p:spPr/>
+        <p:txBody>
+          <a:bodyPr/>
+          <a:lstStyle/>
+          <a:p>
+            <a:fld id="{F9BF1BD6-11A6-594E-AFA1-283323A41F72}" type="slidenum">
+              <a:rPr lang="en-US" smtClean="0"/>
+              <a:pPr/>
+              <a:t>20</a:t>
             </a:fld>
             <a:endParaRPr lang="en-US"/>
           </a:p>
@@ -987,7 +1136,7 @@
           </a:lstStyle>
           <a:p>
             <a:r>
-              <a:rPr lang="en-US" smtClean="0"/>
+              <a:rPr lang="en-US"/>
               <a:t>Click to edit Master title style</a:t>
             </a:r>
             <a:endParaRPr lang="en-US" dirty="0"/>
@@ -1109,7 +1258,7 @@
           </a:lstStyle>
           <a:p>
             <a:r>
-              <a:rPr lang="en-US" smtClean="0"/>
+              <a:rPr lang="en-US"/>
               <a:t>Click to edit Master subtitle style</a:t>
             </a:r>
             <a:endParaRPr lang="en-US" dirty="0"/>
@@ -1144,7 +1293,7 @@
           </a:lstStyle>
           <a:p>
             <a:r>
-              <a:rPr lang="en-US" smtClean="0"/>
+              <a:rPr lang="en-US"/>
               <a:t>Presenter &lt;address@genome.wustl.edu&gt;</a:t>
             </a:r>
             <a:endParaRPr lang="en-US" dirty="0"/>
@@ -1161,13 +1310,6 @@
   <p:clrMapOvr>
     <a:masterClrMapping/>
   </p:clrMapOvr>
-  <p:timing>
-    <p:tnLst>
-      <p:par>
-        <p:cTn xmlns:p14="http://schemas.microsoft.com/office/powerpoint/2010/main" id="1" dur="indefinite" restart="never" nodeType="tmRoot"/>
-      </p:par>
-    </p:tnLst>
-  </p:timing>
 </p:sldLayout>
 </file>
 
@@ -1204,7 +1346,7 @@
           <a:lstStyle/>
           <a:p>
             <a:r>
-              <a:rPr lang="en-US" smtClean="0"/>
+              <a:rPr lang="en-US"/>
               <a:t>Click to edit Master title style</a:t>
             </a:r>
             <a:endParaRPr lang="en-US" dirty="0"/>
@@ -1234,7 +1376,7 @@
           </a:lstStyle>
           <a:p>
             <a:r>
-              <a:rPr lang="en-US" smtClean="0"/>
+              <a:rPr lang="en-US"/>
               <a:t>Presenter &lt;address@genome.wustl.edu&gt;</a:t>
             </a:r>
             <a:endParaRPr lang="en-US" dirty="0"/>
@@ -1268,35 +1410,35 @@
           <a:p>
             <a:pPr lvl="0"/>
             <a:r>
-              <a:rPr lang="en-US" smtClean="0"/>
+              <a:rPr lang="en-US"/>
               <a:t>Click to edit Master text styles</a:t>
             </a:r>
           </a:p>
           <a:p>
             <a:pPr lvl="1"/>
             <a:r>
-              <a:rPr lang="en-US" smtClean="0"/>
+              <a:rPr lang="en-US"/>
               <a:t>Second level</a:t>
             </a:r>
           </a:p>
           <a:p>
             <a:pPr lvl="2"/>
             <a:r>
-              <a:rPr lang="en-US" smtClean="0"/>
+              <a:rPr lang="en-US"/>
               <a:t>Third level</a:t>
             </a:r>
           </a:p>
           <a:p>
             <a:pPr lvl="3"/>
             <a:r>
-              <a:rPr lang="en-US" smtClean="0"/>
+              <a:rPr lang="en-US"/>
               <a:t>Fourth level</a:t>
             </a:r>
           </a:p>
           <a:p>
             <a:pPr lvl="4"/>
             <a:r>
-              <a:rPr lang="en-US" smtClean="0"/>
+              <a:rPr lang="en-US"/>
               <a:t>Fifth level</a:t>
             </a:r>
             <a:endParaRPr lang="en-US" dirty="0"/>
@@ -1371,7 +1513,7 @@
           </a:lstStyle>
           <a:p>
             <a:r>
-              <a:rPr lang="en-US" smtClean="0"/>
+              <a:rPr lang="en-US"/>
               <a:t>Click to edit Master title style</a:t>
             </a:r>
             <a:endParaRPr lang="en-US" dirty="0"/>
@@ -1394,7 +1536,7 @@
           <a:lstStyle/>
           <a:p>
             <a:r>
-              <a:rPr lang="en-US" smtClean="0"/>
+              <a:rPr lang="en-US"/>
               <a:t>Presenter &lt;address@genome.wustl.edu&gt;</a:t>
             </a:r>
             <a:endParaRPr lang="en-US" dirty="0"/>
@@ -1469,10 +1611,9 @@
           </a:lstStyle>
           <a:p>
             <a:r>
-              <a:rPr lang="en-US" dirty="0" smtClean="0"/>
+              <a:rPr lang="en-US" dirty="0"/>
               <a:t>Click to edit Master section title style</a:t>
             </a:r>
-            <a:endParaRPr lang="en-US" dirty="0"/>
           </a:p>
         </p:txBody>
       </p:sp>
@@ -1591,7 +1732,7 @@
           <a:p>
             <a:pPr lvl="0"/>
             <a:r>
-              <a:rPr lang="en-US" dirty="0" smtClean="0"/>
+              <a:rPr lang="en-US" dirty="0"/>
               <a:t>Click to edit Master section subtitle styles</a:t>
             </a:r>
           </a:p>
@@ -1620,7 +1761,7 @@
           </a:lstStyle>
           <a:p>
             <a:r>
-              <a:rPr lang="en-US" smtClean="0"/>
+              <a:rPr lang="en-US"/>
               <a:t>Presenter &lt;address@genome.wustl.edu&gt;</a:t>
             </a:r>
             <a:endParaRPr lang="en-US" dirty="0"/>
@@ -1673,7 +1814,7 @@
           <a:lstStyle/>
           <a:p>
             <a:r>
-              <a:rPr lang="en-US" smtClean="0"/>
+              <a:rPr lang="en-US"/>
               <a:t>Click to edit Master title style</a:t>
             </a:r>
             <a:endParaRPr lang="en-US" dirty="0"/>
@@ -1730,35 +1871,35 @@
           <a:p>
             <a:pPr lvl="0"/>
             <a:r>
-              <a:rPr lang="en-US" smtClean="0"/>
+              <a:rPr lang="en-US"/>
               <a:t>Click to edit Master text styles</a:t>
             </a:r>
           </a:p>
           <a:p>
             <a:pPr lvl="1"/>
             <a:r>
-              <a:rPr lang="en-US" smtClean="0"/>
+              <a:rPr lang="en-US"/>
               <a:t>Second level</a:t>
             </a:r>
           </a:p>
           <a:p>
             <a:pPr lvl="2"/>
             <a:r>
-              <a:rPr lang="en-US" smtClean="0"/>
+              <a:rPr lang="en-US"/>
               <a:t>Third level</a:t>
             </a:r>
           </a:p>
           <a:p>
             <a:pPr lvl="3"/>
             <a:r>
-              <a:rPr lang="en-US" smtClean="0"/>
+              <a:rPr lang="en-US"/>
               <a:t>Fourth level</a:t>
             </a:r>
           </a:p>
           <a:p>
             <a:pPr lvl="4"/>
             <a:r>
-              <a:rPr lang="en-US" smtClean="0"/>
+              <a:rPr lang="en-US"/>
               <a:t>Fifth level</a:t>
             </a:r>
             <a:endParaRPr lang="en-US" dirty="0"/>
@@ -1815,35 +1956,35 @@
           <a:p>
             <a:pPr lvl="0"/>
             <a:r>
-              <a:rPr lang="en-US" smtClean="0"/>
+              <a:rPr lang="en-US"/>
               <a:t>Click to edit Master text styles</a:t>
             </a:r>
           </a:p>
           <a:p>
             <a:pPr lvl="1"/>
             <a:r>
-              <a:rPr lang="en-US" smtClean="0"/>
+              <a:rPr lang="en-US"/>
               <a:t>Second level</a:t>
             </a:r>
           </a:p>
           <a:p>
             <a:pPr lvl="2"/>
             <a:r>
-              <a:rPr lang="en-US" smtClean="0"/>
+              <a:rPr lang="en-US"/>
               <a:t>Third level</a:t>
             </a:r>
           </a:p>
           <a:p>
             <a:pPr lvl="3"/>
             <a:r>
-              <a:rPr lang="en-US" smtClean="0"/>
+              <a:rPr lang="en-US"/>
               <a:t>Fourth level</a:t>
             </a:r>
           </a:p>
           <a:p>
             <a:pPr lvl="4"/>
             <a:r>
-              <a:rPr lang="en-US" smtClean="0"/>
+              <a:rPr lang="en-US"/>
               <a:t>Fifth level</a:t>
             </a:r>
             <a:endParaRPr lang="en-US" dirty="0"/>
@@ -1866,7 +2007,7 @@
           <a:lstStyle/>
           <a:p>
             <a:r>
-              <a:rPr lang="en-US" smtClean="0"/>
+              <a:rPr lang="en-US"/>
               <a:t>Presenter &lt;address@genome.wustl.edu&gt;</a:t>
             </a:r>
             <a:endParaRPr lang="en-US" dirty="0"/>
@@ -1919,10 +2060,9 @@
           <a:lstStyle/>
           <a:p>
             <a:r>
-              <a:rPr lang="en-US" smtClean="0"/>
+              <a:rPr lang="en-US"/>
               <a:t>Click to edit Master title style</a:t>
             </a:r>
-            <a:endParaRPr lang="en-US"/>
           </a:p>
         </p:txBody>
       </p:sp>
@@ -1942,7 +2082,7 @@
           <a:lstStyle/>
           <a:p>
             <a:r>
-              <a:rPr lang="en-US" smtClean="0"/>
+              <a:rPr lang="en-US"/>
               <a:t>Presenter &lt;address@genome.wustl.edu&gt;</a:t>
             </a:r>
             <a:endParaRPr lang="en-US" dirty="0"/>
@@ -2006,7 +2146,7 @@
           <a:lstStyle/>
           <a:p>
             <a:r>
-              <a:rPr lang="en-US" smtClean="0"/>
+              <a:rPr lang="en-US"/>
               <a:t>Presenter &lt;address@genome.wustl.edu&gt;</a:t>
             </a:r>
             <a:endParaRPr lang="en-US" dirty="0"/>
@@ -2081,7 +2221,7 @@
           </a:lstStyle>
           <a:p>
             <a:r>
-              <a:rPr lang="en-US" smtClean="0"/>
+              <a:rPr lang="en-US"/>
               <a:t>Click to edit Master title style</a:t>
             </a:r>
             <a:endParaRPr lang="en-US" dirty="0"/>
@@ -2138,35 +2278,35 @@
           <a:p>
             <a:pPr lvl="0"/>
             <a:r>
-              <a:rPr lang="en-US" smtClean="0"/>
+              <a:rPr lang="en-US"/>
               <a:t>Click to edit Master text styles</a:t>
             </a:r>
           </a:p>
           <a:p>
             <a:pPr lvl="1"/>
             <a:r>
-              <a:rPr lang="en-US" smtClean="0"/>
+              <a:rPr lang="en-US"/>
               <a:t>Second level</a:t>
             </a:r>
           </a:p>
           <a:p>
             <a:pPr lvl="2"/>
             <a:r>
-              <a:rPr lang="en-US" smtClean="0"/>
+              <a:rPr lang="en-US"/>
               <a:t>Third level</a:t>
             </a:r>
           </a:p>
           <a:p>
             <a:pPr lvl="3"/>
             <a:r>
-              <a:rPr lang="en-US" smtClean="0"/>
+              <a:rPr lang="en-US"/>
               <a:t>Fourth level</a:t>
             </a:r>
           </a:p>
           <a:p>
             <a:pPr lvl="4"/>
             <a:r>
-              <a:rPr lang="en-US" smtClean="0"/>
+              <a:rPr lang="en-US"/>
               <a:t>Fifth level</a:t>
             </a:r>
             <a:endParaRPr lang="en-US" dirty="0"/>
@@ -2234,7 +2374,7 @@
           <a:p>
             <a:pPr lvl="0"/>
             <a:r>
-              <a:rPr lang="en-US" smtClean="0"/>
+              <a:rPr lang="en-US"/>
               <a:t>Click to edit Master text styles</a:t>
             </a:r>
           </a:p>
@@ -2256,7 +2396,7 @@
           <a:lstStyle/>
           <a:p>
             <a:r>
-              <a:rPr lang="en-US" smtClean="0"/>
+              <a:rPr lang="en-US"/>
               <a:t>Presenter &lt;address@genome.wustl.edu&gt;</a:t>
             </a:r>
             <a:endParaRPr lang="en-US" dirty="0"/>
@@ -2329,10 +2469,9 @@
           </a:lstStyle>
           <a:p>
             <a:r>
-              <a:rPr lang="en-US" smtClean="0"/>
+              <a:rPr lang="en-US"/>
               <a:t>Click to edit Master title style</a:t>
             </a:r>
-            <a:endParaRPr lang="en-US"/>
           </a:p>
         </p:txBody>
       </p:sp>
@@ -2396,7 +2535,7 @@
           </a:lstStyle>
           <a:p>
             <a:r>
-              <a:rPr lang="en-US" smtClean="0"/>
+              <a:rPr lang="en-US"/>
               <a:t>Drag picture to placeholder or click icon to add</a:t>
             </a:r>
             <a:endParaRPr lang="en-US" dirty="0"/>
@@ -2462,7 +2601,7 @@
           <a:p>
             <a:pPr lvl="0"/>
             <a:r>
-              <a:rPr lang="en-US" smtClean="0"/>
+              <a:rPr lang="en-US"/>
               <a:t>Click to edit Master text styles</a:t>
             </a:r>
           </a:p>
@@ -2484,18 +2623,17 @@
           <a:lstStyle/>
           <a:p>
             <a:r>
-              <a:rPr lang="en-US" dirty="0" smtClean="0"/>
+              <a:rPr lang="en-US" dirty="0"/>
               <a:t>Presenter &lt;</a:t>
             </a:r>
             <a:r>
-              <a:rPr lang="en-US" dirty="0" err="1" smtClean="0"/>
+              <a:rPr lang="en-US" dirty="0" err="1"/>
               <a:t>address@genome.wustl.edu</a:t>
             </a:r>
             <a:r>
-              <a:rPr lang="en-US" dirty="0" smtClean="0"/>
+              <a:rPr lang="en-US" dirty="0"/>
               <a:t>&gt;</a:t>
             </a:r>
-            <a:endParaRPr lang="en-US" dirty="0"/>
           </a:p>
         </p:txBody>
       </p:sp>
@@ -2566,7 +2704,7 @@
           <a:lstStyle/>
           <a:p>
             <a:r>
-              <a:rPr lang="en-US" smtClean="0"/>
+              <a:rPr lang="en-US"/>
               <a:t>Click to edit Master title style</a:t>
             </a:r>
             <a:endParaRPr lang="en-US" dirty="0"/>
@@ -2600,35 +2738,35 @@
           <a:p>
             <a:pPr lvl="0"/>
             <a:r>
-              <a:rPr lang="en-US" smtClean="0"/>
+              <a:rPr lang="en-US"/>
               <a:t>Click to edit Master text styles</a:t>
             </a:r>
           </a:p>
           <a:p>
             <a:pPr lvl="1"/>
             <a:r>
-              <a:rPr lang="en-US" smtClean="0"/>
+              <a:rPr lang="en-US"/>
               <a:t>Second level</a:t>
             </a:r>
           </a:p>
           <a:p>
             <a:pPr lvl="2"/>
             <a:r>
-              <a:rPr lang="en-US" smtClean="0"/>
+              <a:rPr lang="en-US"/>
               <a:t>Third level</a:t>
             </a:r>
           </a:p>
           <a:p>
             <a:pPr lvl="3"/>
             <a:r>
-              <a:rPr lang="en-US" smtClean="0"/>
+              <a:rPr lang="en-US"/>
               <a:t>Fourth level</a:t>
             </a:r>
           </a:p>
           <a:p>
             <a:pPr lvl="4"/>
             <a:r>
-              <a:rPr lang="en-US" smtClean="0"/>
+              <a:rPr lang="en-US"/>
               <a:t>Fifth level</a:t>
             </a:r>
             <a:endParaRPr lang="en-US" dirty="0"/>
@@ -2671,7 +2809,7 @@
           </a:lstStyle>
           <a:p>
             <a:r>
-              <a:rPr lang="en-US" smtClean="0"/>
+              <a:rPr lang="en-US"/>
               <a:t>Presenter &lt;address@genome.wustl.edu&gt;</a:t>
             </a:r>
             <a:endParaRPr lang="en-US" dirty="0"/>
@@ -3064,22 +3202,22 @@
           <a:lstStyle/>
           <a:p>
             <a:r>
-              <a:rPr lang="en-US" dirty="0" err="1" smtClean="0"/>
+              <a:rPr lang="en-US" dirty="0" err="1"/>
               <a:t>GenViz</a:t>
             </a:r>
             <a:r>
-              <a:rPr lang="en-US" dirty="0" smtClean="0"/>
+              <a:rPr lang="en-US" dirty="0"/>
               <a:t> Module 3:</a:t>
             </a:r>
             <a:br>
-              <a:rPr lang="en-US" dirty="0" smtClean="0"/>
+              <a:rPr lang="en-US" dirty="0"/>
             </a:br>
             <a:r>
-              <a:rPr lang="en-US" dirty="0" smtClean="0"/>
+              <a:rPr lang="en-US" dirty="0"/>
               <a:t>Introduction to </a:t>
             </a:r>
             <a:r>
-              <a:rPr lang="en-US" dirty="0" err="1" smtClean="0"/>
+              <a:rPr lang="en-US" dirty="0" err="1"/>
               <a:t>GenVisR</a:t>
             </a:r>
             <a:endParaRPr lang="en-US" dirty="0"/>
@@ -3110,38 +3248,34 @@
           <a:p>
             <a:pPr algn="r"/>
             <a:r>
-              <a:rPr lang="en-US" sz="1800" dirty="0" smtClean="0"/>
+              <a:rPr lang="en-US" sz="1800" dirty="0"/>
               <a:t>Malachi Griffith, Obi Griffith, Zachary Skidmore</a:t>
             </a:r>
           </a:p>
           <a:p>
             <a:pPr algn="r"/>
             <a:r>
-              <a:rPr lang="en-US" sz="1800" dirty="0" smtClean="0"/>
+              <a:rPr lang="en-US" sz="1800" dirty="0"/>
               <a:t>Genomic Data Visualization and Interpretation</a:t>
             </a:r>
           </a:p>
           <a:p>
             <a:pPr algn="r"/>
             <a:r>
-              <a:rPr lang="en-US" sz="1800" dirty="0" smtClean="0"/>
-              <a:t>September 11-15, 2017</a:t>
+              <a:rPr lang="en-US" sz="1800" dirty="0"/>
+              <a:t>April 8-12, 2019</a:t>
             </a:r>
           </a:p>
           <a:p>
             <a:pPr algn="r"/>
             <a:r>
-              <a:rPr lang="en-US" sz="1800" dirty="0" smtClean="0"/>
-              <a:t>Berlin </a:t>
-            </a:r>
-          </a:p>
-          <a:p>
-            <a:pPr algn="r"/>
-            <a:endParaRPr lang="en-US" sz="1800" dirty="0" smtClean="0"/>
-          </a:p>
-          <a:p>
-            <a:pPr algn="r"/>
-            <a:endParaRPr lang="en-US" sz="1800" dirty="0"/>
+              <a:rPr lang="en-US" sz="1800" dirty="0" err="1"/>
+              <a:t>Freie</a:t>
+            </a:r>
+            <a:r>
+              <a:rPr lang="en-US" sz="1800" dirty="0"/>
+              <a:t> Universität Berlin</a:t>
+            </a:r>
           </a:p>
         </p:txBody>
       </p:sp>
@@ -3230,13 +3364,6 @@
   <p:clrMapOvr>
     <a:masterClrMapping/>
   </p:clrMapOvr>
-  <p:timing>
-    <p:tnLst>
-      <p:par>
-        <p:cTn xmlns:p14="http://schemas.microsoft.com/office/powerpoint/2010/main" id="1" dur="indefinite" restart="never" nodeType="tmRoot"/>
-      </p:par>
-    </p:tnLst>
-  </p:timing>
 </p:sld>
 </file>
 
@@ -3273,82 +3400,98 @@
           <a:lstStyle/>
           <a:p>
             <a:r>
-              <a:rPr lang="en-US" dirty="0" err="1" smtClean="0"/>
+              <a:rPr lang="en-US" dirty="0" err="1"/>
               <a:t>GenVisR</a:t>
             </a:r>
             <a:r>
-              <a:rPr lang="en-US" dirty="0" smtClean="0"/>
+              <a:rPr lang="en-US" dirty="0"/>
               <a:t>::</a:t>
             </a:r>
             <a:r>
-              <a:rPr lang="en-US" dirty="0" err="1" smtClean="0"/>
-              <a:t>cnSpec</a:t>
-            </a:r>
-            <a:r>
-              <a:rPr lang="en-US" dirty="0" smtClean="0"/>
+              <a:rPr lang="en-US" dirty="0" err="1"/>
+              <a:t>TvTi</a:t>
+            </a:r>
+            <a:r>
+              <a:rPr lang="en-US" dirty="0"/>
               <a:t>()</a:t>
             </a:r>
-            <a:endParaRPr lang="en-US" dirty="0"/>
-          </a:p>
-        </p:txBody>
-      </p:sp>
-      <p:sp>
-        <p:nvSpPr>
-          <p:cNvPr id="3" name="Content Placeholder 2"/>
-          <p:cNvSpPr>
-            <a:spLocks noGrp="1"/>
-          </p:cNvSpPr>
+          </a:p>
+        </p:txBody>
+      </p:sp>
+      <p:pic>
+        <p:nvPicPr>
+          <p:cNvPr id="10" name="Content Placeholder 9" descr="transition_transversion_v4.png"/>
+          <p:cNvPicPr>
+            <a:picLocks noGrp="1" noChangeAspect="1"/>
+          </p:cNvPicPr>
           <p:nvPr>
             <p:ph idx="1"/>
           </p:nvPr>
-        </p:nvSpPr>
+        </p:nvPicPr>
+        <p:blipFill>
+          <a:blip r:embed="rId3">
+            <a:extLst>
+              <a:ext uri="{28A0092B-C50C-407E-A947-70E740481C1C}">
+                <a14:useLocalDpi xmlns:a14="http://schemas.microsoft.com/office/drawing/2010/main" val="0"/>
+              </a:ext>
+            </a:extLst>
+          </a:blip>
+          <a:srcRect t="-9295" b="-9295"/>
+          <a:stretch>
+            <a:fillRect/>
+          </a:stretch>
+        </p:blipFill>
         <p:spPr/>
-        <p:txBody>
-          <a:bodyPr/>
+      </p:pic>
+      <p:sp>
+        <p:nvSpPr>
+          <p:cNvPr id="11" name="TextBox 10"/>
+          <p:cNvSpPr txBox="1"/>
+          <p:nvPr/>
+        </p:nvSpPr>
+        <p:spPr>
+          <a:xfrm>
+            <a:off x="0" y="6136722"/>
+            <a:ext cx="8862786" cy="584776"/>
+          </a:xfrm>
+          <a:prstGeom prst="rect">
+            <a:avLst/>
+          </a:prstGeom>
+          <a:noFill/>
+        </p:spPr>
+        <p:txBody>
+          <a:bodyPr wrap="square" rtlCol="0">
+            <a:spAutoFit/>
+          </a:bodyPr>
           <a:lstStyle/>
           <a:p>
             <a:r>
-              <a:rPr lang="en-US" dirty="0"/>
-              <a:t>What does it do?</a:t>
-            </a:r>
-          </a:p>
-          <a:p>
-            <a:pPr lvl="1"/>
-            <a:r>
-              <a:rPr lang="en-US" dirty="0"/>
-              <a:t>Display recurrent copy number alterations</a:t>
-            </a:r>
-          </a:p>
-          <a:p>
-            <a:r>
-              <a:rPr lang="en-US" dirty="0"/>
-              <a:t>Why do we care?</a:t>
-            </a:r>
-          </a:p>
-          <a:p>
-            <a:pPr lvl="1"/>
-            <a:r>
-              <a:rPr lang="en-US" dirty="0"/>
-              <a:t>Recognize patterns of amplifications and deletions while </a:t>
-            </a:r>
-            <a:r>
-              <a:rPr lang="en-US" dirty="0" smtClean="0"/>
-              <a:t>maintaining </a:t>
-            </a:r>
-            <a:r>
-              <a:rPr lang="en-US" dirty="0"/>
-              <a:t>sample information</a:t>
-            </a:r>
-          </a:p>
-          <a:p>
-            <a:endParaRPr lang="en-US" dirty="0"/>
+              <a:rPr lang="en-US" sz="1600" dirty="0"/>
+              <a:t>This research was originally published in Blood. </a:t>
+            </a:r>
+            <a:r>
+              <a:rPr lang="en-US" sz="1600" dirty="0" err="1"/>
+              <a:t>Krysiak</a:t>
+            </a:r>
+            <a:r>
+              <a:rPr lang="en-US" sz="1600" dirty="0"/>
+              <a:t> et al. Blood 2017 129:473-483 by </a:t>
+            </a:r>
+            <a:r>
+              <a:rPr lang="en-US" sz="1600" dirty="0" err="1"/>
+              <a:t>Krysiak</a:t>
+            </a:r>
+            <a:r>
+              <a:rPr lang="en-US" sz="1600" dirty="0"/>
+              <a:t> et al. licensed under © the American Society of Hematology</a:t>
+            </a:r>
           </a:p>
         </p:txBody>
       </p:sp>
     </p:spTree>
     <p:extLst>
       <p:ext uri="{BB962C8B-B14F-4D97-AF65-F5344CB8AC3E}">
-        <p14:creationId xmlns:p14="http://schemas.microsoft.com/office/powerpoint/2010/main" val="1989961242"/>
+        <p14:creationId xmlns:p14="http://schemas.microsoft.com/office/powerpoint/2010/main" val="1887192775"/>
       </p:ext>
     </p:extLst>
   </p:cSld>
@@ -3391,99 +3534,73 @@
           <a:lstStyle/>
           <a:p>
             <a:r>
-              <a:rPr lang="en-US" dirty="0" err="1" smtClean="0"/>
+              <a:rPr lang="en-US" dirty="0" err="1"/>
               <a:t>GenVisR</a:t>
             </a:r>
             <a:r>
-              <a:rPr lang="en-US" dirty="0" smtClean="0"/>
+              <a:rPr lang="en-US" dirty="0"/>
               <a:t>::</a:t>
             </a:r>
             <a:r>
-              <a:rPr lang="en-US" dirty="0" err="1" smtClean="0"/>
+              <a:rPr lang="en-US" dirty="0" err="1"/>
               <a:t>cnSpec</a:t>
             </a:r>
             <a:r>
-              <a:rPr lang="en-US" dirty="0" smtClean="0"/>
+              <a:rPr lang="en-US" dirty="0"/>
               <a:t>()</a:t>
             </a:r>
+          </a:p>
+        </p:txBody>
+      </p:sp>
+      <p:sp>
+        <p:nvSpPr>
+          <p:cNvPr id="3" name="Content Placeholder 2"/>
+          <p:cNvSpPr>
+            <a:spLocks noGrp="1"/>
+          </p:cNvSpPr>
+          <p:nvPr>
+            <p:ph idx="1"/>
+          </p:nvPr>
+        </p:nvSpPr>
+        <p:spPr/>
+        <p:txBody>
+          <a:bodyPr/>
+          <a:lstStyle/>
+          <a:p>
+            <a:r>
+              <a:rPr lang="en-US" dirty="0"/>
+              <a:t>What does it do?</a:t>
+            </a:r>
+          </a:p>
+          <a:p>
+            <a:pPr lvl="1"/>
+            <a:r>
+              <a:rPr lang="en-US" dirty="0"/>
+              <a:t>Display recurrent copy number alterations</a:t>
+            </a:r>
+          </a:p>
+          <a:p>
+            <a:r>
+              <a:rPr lang="en-US" dirty="0"/>
+              <a:t>Why do we care?</a:t>
+            </a:r>
+          </a:p>
+          <a:p>
+            <a:pPr lvl="1"/>
+            <a:r>
+              <a:rPr lang="en-US" dirty="0"/>
+              <a:t>Recognize patterns of amplifications and deletions while maintaining sample information</a:t>
+            </a:r>
+          </a:p>
+          <a:p>
             <a:endParaRPr lang="en-US" dirty="0"/>
-          </a:p>
-        </p:txBody>
-      </p:sp>
-      <p:pic>
-        <p:nvPicPr>
-          <p:cNvPr id="10" name="Content Placeholder 9" descr="cnSpec_v1.png"/>
-          <p:cNvPicPr>
-            <a:picLocks noGrp="1" noChangeAspect="1"/>
-          </p:cNvPicPr>
-          <p:nvPr>
-            <p:ph idx="1"/>
-          </p:nvPr>
-        </p:nvPicPr>
-        <p:blipFill>
-          <a:blip r:embed="rId2">
-            <a:extLst>
-              <a:ext uri="{28A0092B-C50C-407E-A947-70E740481C1C}">
-                <a14:useLocalDpi xmlns:a14="http://schemas.microsoft.com/office/drawing/2010/main" val="0"/>
-              </a:ext>
-            </a:extLst>
-          </a:blip>
-          <a:srcRect t="-9295" b="-9295"/>
-          <a:stretch>
-            <a:fillRect/>
-          </a:stretch>
-        </p:blipFill>
-        <p:spPr/>
-      </p:pic>
-      <p:sp>
-        <p:nvSpPr>
-          <p:cNvPr id="11" name="TextBox 10"/>
-          <p:cNvSpPr txBox="1"/>
-          <p:nvPr/>
-        </p:nvSpPr>
-        <p:spPr>
-          <a:xfrm>
-            <a:off x="0" y="5964071"/>
-            <a:ext cx="8766091" cy="923330"/>
-          </a:xfrm>
-          <a:prstGeom prst="rect">
-            <a:avLst/>
-          </a:prstGeom>
-          <a:noFill/>
-        </p:spPr>
-        <p:txBody>
-          <a:bodyPr wrap="square" rtlCol="0">
-            <a:spAutoFit/>
-          </a:bodyPr>
-          <a:lstStyle/>
-          <a:p>
-            <a:r>
-              <a:rPr lang="en-US" dirty="0"/>
-              <a:t>Data from: "Genomic characterization of HER2-positive breast cancer and response to </a:t>
-            </a:r>
-            <a:r>
-              <a:rPr lang="en-US" dirty="0" err="1"/>
-              <a:t>neoadjuvant</a:t>
-            </a:r>
-            <a:r>
-              <a:rPr lang="en-US" dirty="0"/>
-              <a:t> </a:t>
-            </a:r>
-            <a:r>
-              <a:rPr lang="en-US" dirty="0" err="1"/>
-              <a:t>trastuzumab</a:t>
-            </a:r>
-            <a:r>
-              <a:rPr lang="en-US" dirty="0"/>
-              <a:t> and chemotherapy-results from the ACOSOG Z1041 (Alliance) trial."</a:t>
-            </a:r>
           </a:p>
         </p:txBody>
       </p:sp>
     </p:spTree>
     <p:extLst>
       <p:ext uri="{BB962C8B-B14F-4D97-AF65-F5344CB8AC3E}">
-        <p14:creationId xmlns:p14="http://schemas.microsoft.com/office/powerpoint/2010/main" val="1559941324"/>
+        <p14:creationId xmlns:p14="http://schemas.microsoft.com/office/powerpoint/2010/main" val="1989961242"/>
       </p:ext>
     </p:extLst>
   </p:cSld>
@@ -3526,109 +3643,104 @@
           <a:lstStyle/>
           <a:p>
             <a:r>
-              <a:rPr lang="en-US" dirty="0" err="1" smtClean="0"/>
+              <a:rPr lang="en-US" dirty="0" err="1"/>
               <a:t>GenVisR</a:t>
             </a:r>
             <a:r>
-              <a:rPr lang="en-US" dirty="0" smtClean="0"/>
+              <a:rPr lang="en-US" dirty="0"/>
               <a:t>::</a:t>
-            </a:r>
-            <a:r>
-              <a:rPr lang="en-US" dirty="0" err="1" smtClean="0"/>
-              <a:t>cnFreq</a:t>
-            </a:r>
-            <a:r>
-              <a:rPr lang="en-US" dirty="0" smtClean="0"/>
-              <a:t>()</a:t>
-            </a:r>
-            <a:endParaRPr lang="en-US" dirty="0"/>
-          </a:p>
-        </p:txBody>
-      </p:sp>
-      <p:sp>
-        <p:nvSpPr>
-          <p:cNvPr id="3" name="Content Placeholder 2"/>
-          <p:cNvSpPr>
-            <a:spLocks noGrp="1"/>
-          </p:cNvSpPr>
-          <p:nvPr>
-            <p:ph idx="1"/>
-          </p:nvPr>
-        </p:nvSpPr>
-        <p:spPr/>
-        <p:txBody>
-          <a:bodyPr/>
-          <a:lstStyle/>
-          <a:p>
-            <a:r>
-              <a:rPr lang="en-US" dirty="0"/>
-              <a:t>What does it do?</a:t>
-            </a:r>
-          </a:p>
-          <a:p>
-            <a:pPr lvl="1"/>
-            <a:r>
-              <a:rPr lang="en-US" dirty="0"/>
-              <a:t>Another view displayed from </a:t>
             </a:r>
             <a:r>
               <a:rPr lang="en-US" dirty="0" err="1"/>
               <a:t>cnSpec</a:t>
             </a:r>
-            <a:endParaRPr lang="en-US" dirty="0"/>
-          </a:p>
-          <a:p>
-            <a:pPr lvl="1"/>
-            <a:r>
-              <a:rPr lang="en-US" dirty="0"/>
-              <a:t>Summarize copy number alterations across a cohort</a:t>
-            </a:r>
-          </a:p>
-          <a:p>
-            <a:pPr lvl="1"/>
-            <a:r>
-              <a:rPr lang="en-US" dirty="0"/>
-              <a:t>Plots segmented copy number alterations for a cohort</a:t>
-            </a:r>
-          </a:p>
-          <a:p>
-            <a:r>
-              <a:rPr lang="en-US" dirty="0"/>
-              <a:t>Why do we care?</a:t>
-            </a:r>
-          </a:p>
-          <a:p>
-            <a:pPr lvl="1"/>
-            <a:r>
-              <a:rPr lang="en-US" dirty="0"/>
-              <a:t>Easily view recurrently amplified/deleted regions</a:t>
-            </a:r>
-          </a:p>
-          <a:p>
-            <a:pPr marL="0" indent="0">
-              <a:buNone/>
-            </a:pPr>
-            <a:endParaRPr lang="en-US" dirty="0"/>
+            <a:r>
+              <a:rPr lang="en-US" dirty="0"/>
+              <a:t>()</a:t>
+            </a:r>
+          </a:p>
+        </p:txBody>
+      </p:sp>
+      <p:pic>
+        <p:nvPicPr>
+          <p:cNvPr id="10" name="Content Placeholder 9" descr="cnSpec_v1.png"/>
+          <p:cNvPicPr>
+            <a:picLocks noGrp="1" noChangeAspect="1"/>
+          </p:cNvPicPr>
+          <p:nvPr>
+            <p:ph idx="1"/>
+          </p:nvPr>
+        </p:nvPicPr>
+        <p:blipFill>
+          <a:blip r:embed="rId2">
+            <a:extLst>
+              <a:ext uri="{28A0092B-C50C-407E-A947-70E740481C1C}">
+                <a14:useLocalDpi xmlns:a14="http://schemas.microsoft.com/office/drawing/2010/main" val="0"/>
+              </a:ext>
+            </a:extLst>
+          </a:blip>
+          <a:srcRect t="-9295" b="-9295"/>
+          <a:stretch>
+            <a:fillRect/>
+          </a:stretch>
+        </p:blipFill>
+        <p:spPr/>
+      </p:pic>
+      <p:sp>
+        <p:nvSpPr>
+          <p:cNvPr id="11" name="TextBox 10"/>
+          <p:cNvSpPr txBox="1"/>
+          <p:nvPr/>
+        </p:nvSpPr>
+        <p:spPr>
+          <a:xfrm>
+            <a:off x="0" y="5964071"/>
+            <a:ext cx="8766091" cy="923330"/>
+          </a:xfrm>
+          <a:prstGeom prst="rect">
+            <a:avLst/>
+          </a:prstGeom>
+          <a:noFill/>
+        </p:spPr>
+        <p:txBody>
+          <a:bodyPr wrap="square" rtlCol="0">
+            <a:spAutoFit/>
+          </a:bodyPr>
+          <a:lstStyle/>
+          <a:p>
+            <a:r>
+              <a:rPr lang="en-US" dirty="0"/>
+              <a:t>Data from: "Genomic characterization of HER2-positive breast cancer and response to </a:t>
+            </a:r>
+            <a:r>
+              <a:rPr lang="en-US" dirty="0" err="1"/>
+              <a:t>neoadjuvant</a:t>
+            </a:r>
+            <a:r>
+              <a:rPr lang="en-US" dirty="0"/>
+              <a:t> </a:t>
+            </a:r>
+            <a:r>
+              <a:rPr lang="en-US" dirty="0" err="1"/>
+              <a:t>trastuzumab</a:t>
+            </a:r>
+            <a:r>
+              <a:rPr lang="en-US" dirty="0"/>
+              <a:t> and chemotherapy-results from the ACOSOG Z1041 (Alliance) trial."</a:t>
+            </a:r>
           </a:p>
         </p:txBody>
       </p:sp>
     </p:spTree>
     <p:extLst>
       <p:ext uri="{BB962C8B-B14F-4D97-AF65-F5344CB8AC3E}">
-        <p14:creationId xmlns:p14="http://schemas.microsoft.com/office/powerpoint/2010/main" val="1572284135"/>
+        <p14:creationId xmlns:p14="http://schemas.microsoft.com/office/powerpoint/2010/main" val="1559941324"/>
       </p:ext>
     </p:extLst>
   </p:cSld>
   <p:clrMapOvr>
     <a:masterClrMapping/>
   </p:clrMapOvr>
-  <p:timing>
-    <p:tnLst>
-      <p:par>
-        <p:cTn xmlns:p14="http://schemas.microsoft.com/office/powerpoint/2010/main" id="1" dur="indefinite" restart="never" nodeType="tmRoot"/>
-      </p:par>
-    </p:tnLst>
-  </p:timing>
 </p:sld>
 </file>
 
@@ -3665,111 +3777,101 @@
           <a:lstStyle/>
           <a:p>
             <a:r>
-              <a:rPr lang="en-US" dirty="0" err="1" smtClean="0"/>
+              <a:rPr lang="en-US" dirty="0" err="1"/>
               <a:t>GenVisR</a:t>
             </a:r>
             <a:r>
-              <a:rPr lang="en-US" dirty="0" smtClean="0"/>
+              <a:rPr lang="en-US" dirty="0"/>
               <a:t>::</a:t>
             </a:r>
             <a:r>
-              <a:rPr lang="en-US" dirty="0" err="1" smtClean="0"/>
+              <a:rPr lang="en-US" dirty="0" err="1"/>
               <a:t>cnFreq</a:t>
             </a:r>
             <a:r>
-              <a:rPr lang="en-US" dirty="0" smtClean="0"/>
+              <a:rPr lang="en-US" dirty="0"/>
               <a:t>()</a:t>
             </a:r>
+          </a:p>
+        </p:txBody>
+      </p:sp>
+      <p:sp>
+        <p:nvSpPr>
+          <p:cNvPr id="3" name="Content Placeholder 2"/>
+          <p:cNvSpPr>
+            <a:spLocks noGrp="1"/>
+          </p:cNvSpPr>
+          <p:nvPr>
+            <p:ph idx="1"/>
+          </p:nvPr>
+        </p:nvSpPr>
+        <p:spPr/>
+        <p:txBody>
+          <a:bodyPr/>
+          <a:lstStyle/>
+          <a:p>
+            <a:r>
+              <a:rPr lang="en-US" dirty="0"/>
+              <a:t>What does it do?</a:t>
+            </a:r>
+          </a:p>
+          <a:p>
+            <a:pPr lvl="1"/>
+            <a:r>
+              <a:rPr lang="en-US" dirty="0"/>
+              <a:t>Another view displayed from </a:t>
+            </a:r>
+            <a:r>
+              <a:rPr lang="en-US" dirty="0" err="1"/>
+              <a:t>cnSpec</a:t>
+            </a:r>
             <a:endParaRPr lang="en-US" dirty="0"/>
           </a:p>
-        </p:txBody>
-      </p:sp>
-      <p:pic>
-        <p:nvPicPr>
-          <p:cNvPr id="6" name="Content Placeholder 5" descr="cnFreq_v1.png"/>
-          <p:cNvPicPr>
-            <a:picLocks noGrp="1" noChangeAspect="1"/>
-          </p:cNvPicPr>
-          <p:nvPr>
-            <p:ph idx="1"/>
-          </p:nvPr>
-        </p:nvPicPr>
-        <p:blipFill>
-          <a:blip r:embed="rId2">
-            <a:extLst>
-              <a:ext uri="{28A0092B-C50C-407E-A947-70E740481C1C}">
-                <a14:useLocalDpi xmlns:a14="http://schemas.microsoft.com/office/drawing/2010/main" val="0"/>
-              </a:ext>
-            </a:extLst>
-          </a:blip>
-          <a:srcRect t="-38943" b="-38943"/>
-          <a:stretch>
-            <a:fillRect/>
-          </a:stretch>
-        </p:blipFill>
-        <p:spPr/>
-      </p:pic>
-      <p:sp>
-        <p:nvSpPr>
-          <p:cNvPr id="8" name="Rectangle 7"/>
-          <p:cNvSpPr/>
-          <p:nvPr/>
-        </p:nvSpPr>
-        <p:spPr>
-          <a:xfrm>
-            <a:off x="0" y="5859723"/>
-            <a:ext cx="8462385" cy="923330"/>
-          </a:xfrm>
-          <a:prstGeom prst="rect">
-            <a:avLst/>
-          </a:prstGeom>
-        </p:spPr>
-        <p:txBody>
-          <a:bodyPr wrap="square">
-            <a:spAutoFit/>
-          </a:bodyPr>
-          <a:lstStyle/>
-          <a:p>
-            <a:r>
-              <a:rPr lang="en-US" dirty="0"/>
-              <a:t>Data from: "Genomic characterization of HER2-positive breast cancer and response to </a:t>
-            </a:r>
-            <a:r>
-              <a:rPr lang="en-US" dirty="0" err="1"/>
-              <a:t>neoadjuvant</a:t>
-            </a:r>
-            <a:r>
-              <a:rPr lang="en-US" dirty="0"/>
-              <a:t> </a:t>
-            </a:r>
-            <a:r>
-              <a:rPr lang="en-US" dirty="0" err="1"/>
-              <a:t>trastuzumab</a:t>
-            </a:r>
-            <a:r>
-              <a:rPr lang="en-US" dirty="0"/>
-              <a:t> and chemotherapy-results from the ACOSOG Z1041 (Alliance) trial."</a:t>
-            </a:r>
+          <a:p>
+            <a:pPr lvl="1"/>
+            <a:r>
+              <a:rPr lang="en-US" dirty="0"/>
+              <a:t>Summarize copy number alterations across a cohort</a:t>
+            </a:r>
+          </a:p>
+          <a:p>
+            <a:pPr lvl="1"/>
+            <a:r>
+              <a:rPr lang="en-US" dirty="0"/>
+              <a:t>Plots segmented copy number alterations for a cohort</a:t>
+            </a:r>
+          </a:p>
+          <a:p>
+            <a:r>
+              <a:rPr lang="en-US" dirty="0"/>
+              <a:t>Why do we care?</a:t>
+            </a:r>
+          </a:p>
+          <a:p>
+            <a:pPr lvl="1"/>
+            <a:r>
+              <a:rPr lang="en-US" dirty="0"/>
+              <a:t>Easily view recurrently amplified/deleted regions</a:t>
+            </a:r>
+          </a:p>
+          <a:p>
+            <a:pPr marL="0" indent="0">
+              <a:buNone/>
+            </a:pPr>
+            <a:endParaRPr lang="en-US" dirty="0"/>
           </a:p>
         </p:txBody>
       </p:sp>
     </p:spTree>
     <p:extLst>
       <p:ext uri="{BB962C8B-B14F-4D97-AF65-F5344CB8AC3E}">
-        <p14:creationId xmlns:p14="http://schemas.microsoft.com/office/powerpoint/2010/main" val="993184315"/>
+        <p14:creationId xmlns:p14="http://schemas.microsoft.com/office/powerpoint/2010/main" val="1572284135"/>
       </p:ext>
     </p:extLst>
   </p:cSld>
   <p:clrMapOvr>
     <a:masterClrMapping/>
   </p:clrMapOvr>
-  <p:timing>
-    <p:tnLst>
-      <p:par>
-        <p:cTn xmlns:p14="http://schemas.microsoft.com/office/powerpoint/2010/main" id="1" dur="indefinite" restart="never" nodeType="tmRoot"/>
-      </p:par>
-    </p:tnLst>
-  </p:timing>
 </p:sld>
 </file>
 
@@ -3806,119 +3908,103 @@
           <a:lstStyle/>
           <a:p>
             <a:r>
-              <a:rPr lang="en-US" dirty="0" err="1" smtClean="0"/>
+              <a:rPr lang="en-US" dirty="0" err="1"/>
               <a:t>GenVisR</a:t>
             </a:r>
             <a:r>
-              <a:rPr lang="en-US" dirty="0" smtClean="0"/>
+              <a:rPr lang="en-US" dirty="0"/>
               <a:t>::</a:t>
             </a:r>
             <a:r>
-              <a:rPr lang="en-US" dirty="0" err="1" smtClean="0"/>
-              <a:t>lohSpec</a:t>
-            </a:r>
-            <a:r>
-              <a:rPr lang="en-US" dirty="0" smtClean="0"/>
+              <a:rPr lang="en-US" dirty="0" err="1"/>
+              <a:t>cnFreq</a:t>
+            </a:r>
+            <a:r>
+              <a:rPr lang="en-US" dirty="0"/>
               <a:t>()</a:t>
             </a:r>
-            <a:endParaRPr lang="en-US" dirty="0"/>
-          </a:p>
-        </p:txBody>
-      </p:sp>
-      <p:sp>
-        <p:nvSpPr>
-          <p:cNvPr id="3" name="Content Placeholder 2"/>
-          <p:cNvSpPr>
-            <a:spLocks noGrp="1"/>
-          </p:cNvSpPr>
+          </a:p>
+        </p:txBody>
+      </p:sp>
+      <p:pic>
+        <p:nvPicPr>
+          <p:cNvPr id="6" name="Content Placeholder 5" descr="cnFreq_v1.png"/>
+          <p:cNvPicPr>
+            <a:picLocks noGrp="1" noChangeAspect="1"/>
+          </p:cNvPicPr>
           <p:nvPr>
             <p:ph idx="1"/>
           </p:nvPr>
-        </p:nvSpPr>
+        </p:nvPicPr>
+        <p:blipFill>
+          <a:blip r:embed="rId2">
+            <a:extLst>
+              <a:ext uri="{28A0092B-C50C-407E-A947-70E740481C1C}">
+                <a14:useLocalDpi xmlns:a14="http://schemas.microsoft.com/office/drawing/2010/main" val="0"/>
+              </a:ext>
+            </a:extLst>
+          </a:blip>
+          <a:srcRect t="-38943" b="-38943"/>
+          <a:stretch>
+            <a:fillRect/>
+          </a:stretch>
+        </p:blipFill>
         <p:spPr/>
-        <p:txBody>
-          <a:bodyPr/>
+      </p:pic>
+      <p:sp>
+        <p:nvSpPr>
+          <p:cNvPr id="8" name="Rectangle 7"/>
+          <p:cNvSpPr/>
+          <p:nvPr/>
+        </p:nvSpPr>
+        <p:spPr>
+          <a:xfrm>
+            <a:off x="0" y="5859723"/>
+            <a:ext cx="8462385" cy="923330"/>
+          </a:xfrm>
+          <a:prstGeom prst="rect">
+            <a:avLst/>
+          </a:prstGeom>
+        </p:spPr>
+        <p:txBody>
+          <a:bodyPr wrap="square">
+            <a:spAutoFit/>
+          </a:bodyPr>
           <a:lstStyle/>
           <a:p>
             <a:r>
               <a:rPr lang="en-US" dirty="0"/>
-              <a:t>What does it do?</a:t>
-            </a:r>
-          </a:p>
-          <a:p>
-            <a:pPr lvl="1"/>
-            <a:r>
-              <a:rPr lang="en-US" dirty="0"/>
-              <a:t>Visualize loss of </a:t>
+              <a:t>Data from: "Genomic characterization of HER2-positive breast cancer and response to </a:t>
             </a:r>
             <a:r>
               <a:rPr lang="en-US" dirty="0" err="1"/>
-              <a:t>heterozygosity</a:t>
-            </a:r>
-            <a:r>
-              <a:rPr lang="en-US" dirty="0"/>
-              <a:t> (LOH) for multiple samples</a:t>
-            </a:r>
-          </a:p>
-          <a:p>
-            <a:r>
-              <a:rPr lang="en-US" dirty="0"/>
-              <a:t>Why we </a:t>
-            </a:r>
-            <a:r>
-              <a:rPr lang="en-US" dirty="0" smtClean="0"/>
-              <a:t>care?</a:t>
-            </a:r>
-            <a:endParaRPr lang="en-US" dirty="0"/>
-          </a:p>
-          <a:p>
-            <a:pPr lvl="1"/>
-            <a:r>
-              <a:rPr lang="en-US" dirty="0"/>
-              <a:t>Copy-neutral LOH could be missed with a plot produced with functions such as </a:t>
+              <a:t>neoadjuvant</a:t>
+            </a:r>
+            <a:r>
+              <a:rPr lang="en-US" dirty="0"/>
+              <a:t> </a:t>
             </a:r>
             <a:r>
               <a:rPr lang="en-US" dirty="0" err="1"/>
-              <a:t>cnSpec</a:t>
-            </a:r>
-            <a:r>
-              <a:rPr lang="en-US" dirty="0"/>
-              <a:t> however these events are potentially interesting</a:t>
-            </a:r>
-          </a:p>
-          <a:p>
-            <a:pPr lvl="1"/>
-            <a:r>
-              <a:rPr lang="en-US" dirty="0" err="1"/>
-              <a:t>lohSpec</a:t>
-            </a:r>
-            <a:r>
-              <a:rPr lang="en-US" dirty="0"/>
-              <a:t> allows these events to be viewed and summarized for multiple samples allowing viewing of recurrent LOH patterns </a:t>
-            </a:r>
-          </a:p>
-          <a:p>
-            <a:endParaRPr lang="en-US" dirty="0"/>
+              <a:t>trastuzumab</a:t>
+            </a:r>
+            <a:r>
+              <a:rPr lang="en-US" dirty="0"/>
+              <a:t> and chemotherapy-results from the ACOSOG Z1041 (Alliance) trial."</a:t>
+            </a:r>
           </a:p>
         </p:txBody>
       </p:sp>
     </p:spTree>
     <p:extLst>
       <p:ext uri="{BB962C8B-B14F-4D97-AF65-F5344CB8AC3E}">
-        <p14:creationId xmlns:p14="http://schemas.microsoft.com/office/powerpoint/2010/main" val="3264973403"/>
+        <p14:creationId xmlns:p14="http://schemas.microsoft.com/office/powerpoint/2010/main" val="993184315"/>
       </p:ext>
     </p:extLst>
   </p:cSld>
   <p:clrMapOvr>
     <a:masterClrMapping/>
   </p:clrMapOvr>
-  <p:timing>
-    <p:tnLst>
-      <p:par>
-        <p:cTn xmlns:p14="http://schemas.microsoft.com/office/powerpoint/2010/main" id="1" dur="indefinite" restart="never" nodeType="tmRoot"/>
-      </p:par>
-    </p:tnLst>
-  </p:timing>
 </p:sld>
 </file>
 
@@ -3955,22 +4041,157 @@
           <a:lstStyle/>
           <a:p>
             <a:r>
-              <a:rPr lang="en-US" dirty="0" err="1" smtClean="0"/>
+              <a:rPr lang="en-US" dirty="0" err="1"/>
               <a:t>GenVisR</a:t>
             </a:r>
             <a:r>
-              <a:rPr lang="en-US" dirty="0" smtClean="0"/>
+              <a:rPr lang="en-US" dirty="0"/>
               <a:t>::</a:t>
             </a:r>
             <a:r>
-              <a:rPr lang="en-US" dirty="0" err="1" smtClean="0"/>
+              <a:rPr lang="en-US" dirty="0" err="1"/>
               <a:t>lohSpec</a:t>
             </a:r>
             <a:r>
-              <a:rPr lang="en-US" dirty="0" smtClean="0"/>
+              <a:rPr lang="en-US" dirty="0"/>
+              <a:t>()</a:t>
+            </a:r>
+          </a:p>
+        </p:txBody>
+      </p:sp>
+      <p:sp>
+        <p:nvSpPr>
+          <p:cNvPr id="3" name="Content Placeholder 2"/>
+          <p:cNvSpPr>
+            <a:spLocks noGrp="1"/>
+          </p:cNvSpPr>
+          <p:nvPr>
+            <p:ph idx="1"/>
+          </p:nvPr>
+        </p:nvSpPr>
+        <p:spPr/>
+        <p:txBody>
+          <a:bodyPr/>
+          <a:lstStyle/>
+          <a:p>
+            <a:r>
+              <a:rPr lang="en-US" dirty="0"/>
+              <a:t>What does it do?</a:t>
+            </a:r>
+          </a:p>
+          <a:p>
+            <a:pPr lvl="1"/>
+            <a:r>
+              <a:rPr lang="en-US" dirty="0"/>
+              <a:t>Visualize loss of </a:t>
+            </a:r>
+            <a:r>
+              <a:rPr lang="en-US" dirty="0" err="1"/>
+              <a:t>heterozygosity</a:t>
+            </a:r>
+            <a:r>
+              <a:rPr lang="en-US" dirty="0"/>
+              <a:t> (LOH) for multiple samples</a:t>
+            </a:r>
+          </a:p>
+          <a:p>
+            <a:r>
+              <a:rPr lang="en-US" dirty="0"/>
+              <a:t>Why we care?</a:t>
+            </a:r>
+          </a:p>
+          <a:p>
+            <a:pPr lvl="1"/>
+            <a:r>
+              <a:rPr lang="en-US" dirty="0"/>
+              <a:t>Copy-neutral LOH could be missed with a plot produced with functions such as </a:t>
+            </a:r>
+            <a:r>
+              <a:rPr lang="en-US" dirty="0" err="1"/>
+              <a:t>cnSpec</a:t>
+            </a:r>
+            <a:r>
+              <a:rPr lang="en-US" dirty="0"/>
+              <a:t> however these events are potentially interesting</a:t>
+            </a:r>
+          </a:p>
+          <a:p>
+            <a:pPr lvl="1"/>
+            <a:r>
+              <a:rPr lang="en-US" dirty="0" err="1"/>
+              <a:t>lohSpec</a:t>
+            </a:r>
+            <a:r>
+              <a:rPr lang="en-US" dirty="0"/>
+              <a:t> allows these events to be viewed and summarized for multiple samples allowing viewing of recurrent LOH patterns </a:t>
+            </a:r>
+          </a:p>
+          <a:p>
+            <a:endParaRPr lang="en-US" dirty="0"/>
+          </a:p>
+        </p:txBody>
+      </p:sp>
+    </p:spTree>
+    <p:extLst>
+      <p:ext uri="{BB962C8B-B14F-4D97-AF65-F5344CB8AC3E}">
+        <p14:creationId xmlns:p14="http://schemas.microsoft.com/office/powerpoint/2010/main" val="3264973403"/>
+      </p:ext>
+    </p:extLst>
+  </p:cSld>
+  <p:clrMapOvr>
+    <a:masterClrMapping/>
+  </p:clrMapOvr>
+</p:sld>
+</file>
+
+<file path=ppt/slides/slide16.xml><?xml version="1.0" encoding="utf-8"?>
+<p:sld xmlns:a="http://schemas.openxmlformats.org/drawingml/2006/main" xmlns:r="http://schemas.openxmlformats.org/officeDocument/2006/relationships" xmlns:p="http://schemas.openxmlformats.org/presentationml/2006/main">
+  <p:cSld>
+    <p:spTree>
+      <p:nvGrpSpPr>
+        <p:cNvPr id="1" name=""/>
+        <p:cNvGrpSpPr/>
+        <p:nvPr/>
+      </p:nvGrpSpPr>
+      <p:grpSpPr>
+        <a:xfrm>
+          <a:off x="0" y="0"/>
+          <a:ext cx="0" cy="0"/>
+          <a:chOff x="0" y="0"/>
+          <a:chExt cx="0" cy="0"/>
+        </a:xfrm>
+      </p:grpSpPr>
+      <p:sp>
+        <p:nvSpPr>
+          <p:cNvPr id="2" name="Title 1"/>
+          <p:cNvSpPr>
+            <a:spLocks noGrp="1"/>
+          </p:cNvSpPr>
+          <p:nvPr>
+            <p:ph type="title"/>
+          </p:nvPr>
+        </p:nvSpPr>
+        <p:spPr/>
+        <p:txBody>
+          <a:bodyPr/>
+          <a:lstStyle/>
+          <a:p>
+            <a:r>
+              <a:rPr lang="en-US" dirty="0" err="1"/>
+              <a:t>GenVisR</a:t>
+            </a:r>
+            <a:r>
+              <a:rPr lang="en-US" dirty="0"/>
+              <a:t>::</a:t>
+            </a:r>
+            <a:r>
+              <a:rPr lang="en-US" dirty="0" err="1"/>
+              <a:t>lohSpec</a:t>
+            </a:r>
+            <a:r>
+              <a:rPr lang="en-US" dirty="0"/>
               <a:t>() for 3 breast cancer cell lines</a:t>
             </a:r>
-            <a:endParaRPr lang="en-US" dirty="0"/>
           </a:p>
         </p:txBody>
       </p:sp>
@@ -4012,133 +4233,6 @@
 </p:sld>
 </file>
 
-<file path=ppt/slides/slide16.xml><?xml version="1.0" encoding="utf-8"?>
-<p:sld xmlns:a="http://schemas.openxmlformats.org/drawingml/2006/main" xmlns:r="http://schemas.openxmlformats.org/officeDocument/2006/relationships" xmlns:p="http://schemas.openxmlformats.org/presentationml/2006/main">
-  <p:cSld>
-    <p:spTree>
-      <p:nvGrpSpPr>
-        <p:cNvPr id="1" name=""/>
-        <p:cNvGrpSpPr/>
-        <p:nvPr/>
-      </p:nvGrpSpPr>
-      <p:grpSpPr>
-        <a:xfrm>
-          <a:off x="0" y="0"/>
-          <a:ext cx="0" cy="0"/>
-          <a:chOff x="0" y="0"/>
-          <a:chExt cx="0" cy="0"/>
-        </a:xfrm>
-      </p:grpSpPr>
-      <p:sp>
-        <p:nvSpPr>
-          <p:cNvPr id="2" name="Title 1"/>
-          <p:cNvSpPr>
-            <a:spLocks noGrp="1"/>
-          </p:cNvSpPr>
-          <p:nvPr>
-            <p:ph type="title"/>
-          </p:nvPr>
-        </p:nvSpPr>
-        <p:spPr/>
-        <p:txBody>
-          <a:bodyPr/>
-          <a:lstStyle/>
-          <a:p>
-            <a:r>
-              <a:rPr lang="en-US" dirty="0" err="1" smtClean="0"/>
-              <a:t>GenVisR</a:t>
-            </a:r>
-            <a:r>
-              <a:rPr lang="en-US" dirty="0" smtClean="0"/>
-              <a:t>::</a:t>
-            </a:r>
-            <a:r>
-              <a:rPr lang="en-US" dirty="0" err="1" smtClean="0"/>
-              <a:t>genCov</a:t>
-            </a:r>
-            <a:r>
-              <a:rPr lang="en-US" dirty="0" smtClean="0"/>
-              <a:t>()</a:t>
-            </a:r>
-            <a:endParaRPr lang="en-US" dirty="0"/>
-          </a:p>
-        </p:txBody>
-      </p:sp>
-      <p:sp>
-        <p:nvSpPr>
-          <p:cNvPr id="3" name="Content Placeholder 2"/>
-          <p:cNvSpPr>
-            <a:spLocks noGrp="1"/>
-          </p:cNvSpPr>
-          <p:nvPr>
-            <p:ph idx="1"/>
-          </p:nvPr>
-        </p:nvSpPr>
-        <p:spPr/>
-        <p:txBody>
-          <a:bodyPr/>
-          <a:lstStyle/>
-          <a:p>
-            <a:r>
-              <a:rPr lang="en-US" dirty="0"/>
-              <a:t>What does it do?</a:t>
-            </a:r>
-          </a:p>
-          <a:p>
-            <a:pPr lvl="1"/>
-            <a:r>
-              <a:rPr lang="en-US" dirty="0"/>
-              <a:t>Visualize coverage in a region of interest</a:t>
-            </a:r>
-          </a:p>
-          <a:p>
-            <a:r>
-              <a:rPr lang="en-US" dirty="0"/>
-              <a:t>Why do we care?</a:t>
-            </a:r>
-          </a:p>
-          <a:p>
-            <a:pPr lvl="1"/>
-            <a:r>
-              <a:rPr lang="en-US" dirty="0"/>
-              <a:t>Infer the impact of a structural deletion</a:t>
-            </a:r>
-          </a:p>
-          <a:p>
-            <a:pPr lvl="1"/>
-            <a:r>
-              <a:rPr lang="en-US" dirty="0"/>
-              <a:t>Verify gene knockouts</a:t>
-            </a:r>
-          </a:p>
-          <a:p>
-            <a:pPr marL="0" indent="0">
-              <a:buNone/>
-            </a:pPr>
-            <a:endParaRPr lang="en-US" dirty="0"/>
-          </a:p>
-        </p:txBody>
-      </p:sp>
-    </p:spTree>
-    <p:extLst>
-      <p:ext uri="{BB962C8B-B14F-4D97-AF65-F5344CB8AC3E}">
-        <p14:creationId xmlns:p14="http://schemas.microsoft.com/office/powerpoint/2010/main" val="3692564877"/>
-      </p:ext>
-    </p:extLst>
-  </p:cSld>
-  <p:clrMapOvr>
-    <a:masterClrMapping/>
-  </p:clrMapOvr>
-  <p:timing>
-    <p:tnLst>
-      <p:par>
-        <p:cTn xmlns:p14="http://schemas.microsoft.com/office/powerpoint/2010/main" id="1" dur="indefinite" restart="never" nodeType="tmRoot"/>
-      </p:par>
-    </p:tnLst>
-  </p:timing>
-</p:sld>
-</file>
-
 <file path=ppt/slides/slide17.xml><?xml version="1.0" encoding="utf-8"?>
 <p:sld xmlns:a="http://schemas.openxmlformats.org/drawingml/2006/main" xmlns:r="http://schemas.openxmlformats.org/officeDocument/2006/relationships" xmlns:p="http://schemas.openxmlformats.org/presentationml/2006/main">
   <p:cSld>
@@ -4172,100 +4266,89 @@
           <a:lstStyle/>
           <a:p>
             <a:r>
-              <a:rPr lang="en-US" dirty="0" err="1" smtClean="0"/>
+              <a:rPr lang="en-US" dirty="0" err="1"/>
               <a:t>GenVisR</a:t>
             </a:r>
             <a:r>
-              <a:rPr lang="en-US" dirty="0" smtClean="0"/>
+              <a:rPr lang="en-US" dirty="0"/>
               <a:t>::</a:t>
             </a:r>
             <a:r>
-              <a:rPr lang="en-US" dirty="0" err="1" smtClean="0"/>
+              <a:rPr lang="en-US" dirty="0" err="1"/>
               <a:t>genCov</a:t>
             </a:r>
             <a:r>
-              <a:rPr lang="en-US" dirty="0" smtClean="0"/>
+              <a:rPr lang="en-US" dirty="0"/>
               <a:t>()</a:t>
             </a:r>
+          </a:p>
+        </p:txBody>
+      </p:sp>
+      <p:sp>
+        <p:nvSpPr>
+          <p:cNvPr id="3" name="Content Placeholder 2"/>
+          <p:cNvSpPr>
+            <a:spLocks noGrp="1"/>
+          </p:cNvSpPr>
+          <p:nvPr>
+            <p:ph idx="1"/>
+          </p:nvPr>
+        </p:nvSpPr>
+        <p:spPr/>
+        <p:txBody>
+          <a:bodyPr/>
+          <a:lstStyle/>
+          <a:p>
+            <a:r>
+              <a:rPr lang="en-US" dirty="0"/>
+              <a:t>What does it do?</a:t>
+            </a:r>
+          </a:p>
+          <a:p>
+            <a:pPr lvl="1"/>
+            <a:r>
+              <a:rPr lang="en-US" dirty="0"/>
+              <a:t>Visualize coverage in a region of interest</a:t>
+            </a:r>
+          </a:p>
+          <a:p>
+            <a:r>
+              <a:rPr lang="en-US" dirty="0"/>
+              <a:t>Why do we care?</a:t>
+            </a:r>
+          </a:p>
+          <a:p>
+            <a:pPr lvl="1"/>
+            <a:r>
+              <a:rPr lang="en-US" dirty="0"/>
+              <a:t>Infer the impact of a structural deletion</a:t>
+            </a:r>
+          </a:p>
+          <a:p>
+            <a:pPr lvl="1"/>
+            <a:r>
+              <a:rPr lang="en-US" dirty="0"/>
+              <a:t>Verify gene knockouts</a:t>
+            </a:r>
+          </a:p>
+          <a:p>
+            <a:pPr marL="0" indent="0">
+              <a:buNone/>
+            </a:pPr>
             <a:endParaRPr lang="en-US" dirty="0"/>
-          </a:p>
-        </p:txBody>
-      </p:sp>
-      <p:pic>
-        <p:nvPicPr>
-          <p:cNvPr id="4" name="Content Placeholder 3" descr="IKZF1_all_log2.png"/>
-          <p:cNvPicPr>
-            <a:picLocks noGrp="1" noChangeAspect="1"/>
-          </p:cNvPicPr>
-          <p:nvPr>
-            <p:ph idx="1"/>
-          </p:nvPr>
-        </p:nvPicPr>
-        <p:blipFill>
-          <a:blip r:embed="rId2">
-            <a:extLst>
-              <a:ext uri="{28A0092B-C50C-407E-A947-70E740481C1C}">
-                <a14:useLocalDpi xmlns:a14="http://schemas.microsoft.com/office/drawing/2010/main" val="0"/>
-              </a:ext>
-            </a:extLst>
-          </a:blip>
-          <a:srcRect l="-17459" r="-17459"/>
-          <a:stretch>
-            <a:fillRect/>
-          </a:stretch>
-        </p:blipFill>
-        <p:spPr/>
-      </p:pic>
-      <p:sp>
-        <p:nvSpPr>
-          <p:cNvPr id="5" name="TextBox 4"/>
-          <p:cNvSpPr txBox="1"/>
-          <p:nvPr/>
-        </p:nvSpPr>
-        <p:spPr>
-          <a:xfrm>
-            <a:off x="0" y="6211669"/>
-            <a:ext cx="8545213" cy="646331"/>
-          </a:xfrm>
-          <a:prstGeom prst="rect">
-            <a:avLst/>
-          </a:prstGeom>
-          <a:noFill/>
-        </p:spPr>
-        <p:txBody>
-          <a:bodyPr wrap="square" rtlCol="0">
-            <a:spAutoFit/>
-          </a:bodyPr>
-          <a:lstStyle/>
-          <a:p>
-            <a:r>
-              <a:rPr lang="en-US" dirty="0" smtClean="0"/>
-              <a:t>Fig. 2: </a:t>
-            </a:r>
-            <a:r>
-              <a:rPr lang="en-US" dirty="0"/>
-              <a:t>“Comprehensive genomic analysis reveals FLT3 activation and a therapeutic strategy for a patient with relapsed adult B-lymphoblastic leukemia”</a:t>
-            </a:r>
           </a:p>
         </p:txBody>
       </p:sp>
     </p:spTree>
     <p:extLst>
       <p:ext uri="{BB962C8B-B14F-4D97-AF65-F5344CB8AC3E}">
-        <p14:creationId xmlns:p14="http://schemas.microsoft.com/office/powerpoint/2010/main" val="3978966196"/>
+        <p14:creationId xmlns:p14="http://schemas.microsoft.com/office/powerpoint/2010/main" val="3692564877"/>
       </p:ext>
     </p:extLst>
   </p:cSld>
   <p:clrMapOvr>
     <a:masterClrMapping/>
   </p:clrMapOvr>
-  <p:timing>
-    <p:tnLst>
-      <p:par>
-        <p:cTn xmlns:p14="http://schemas.microsoft.com/office/powerpoint/2010/main" id="1" dur="indefinite" restart="never" nodeType="tmRoot"/>
-      </p:par>
-    </p:tnLst>
-  </p:timing>
 </p:sld>
 </file>
 
@@ -4302,90 +4385,88 @@
           <a:lstStyle/>
           <a:p>
             <a:r>
-              <a:rPr lang="en-US" dirty="0" err="1" smtClean="0"/>
+              <a:rPr lang="en-US" dirty="0" err="1"/>
               <a:t>GenVisR</a:t>
             </a:r>
             <a:r>
-              <a:rPr lang="en-US" dirty="0" smtClean="0"/>
+              <a:rPr lang="en-US" dirty="0"/>
               <a:t>::</a:t>
             </a:r>
             <a:r>
-              <a:rPr lang="en-US" dirty="0" err="1" smtClean="0"/>
-              <a:t>covBars</a:t>
-            </a:r>
-            <a:r>
-              <a:rPr lang="en-US" dirty="0" smtClean="0"/>
+              <a:rPr lang="en-US" dirty="0" err="1"/>
+              <a:t>genCov</a:t>
+            </a:r>
+            <a:r>
+              <a:rPr lang="en-US" dirty="0"/>
               <a:t>()</a:t>
             </a:r>
-            <a:endParaRPr lang="en-US" dirty="0"/>
-          </a:p>
-        </p:txBody>
-      </p:sp>
-      <p:sp>
-        <p:nvSpPr>
-          <p:cNvPr id="3" name="Content Placeholder 2"/>
-          <p:cNvSpPr>
-            <a:spLocks noGrp="1"/>
-          </p:cNvSpPr>
+          </a:p>
+        </p:txBody>
+      </p:sp>
+      <p:pic>
+        <p:nvPicPr>
+          <p:cNvPr id="4" name="Content Placeholder 3" descr="IKZF1_all_log2.png"/>
+          <p:cNvPicPr>
+            <a:picLocks noGrp="1" noChangeAspect="1"/>
+          </p:cNvPicPr>
           <p:nvPr>
             <p:ph idx="1"/>
           </p:nvPr>
-        </p:nvSpPr>
+        </p:nvPicPr>
+        <p:blipFill>
+          <a:blip r:embed="rId2">
+            <a:extLst>
+              <a:ext uri="{28A0092B-C50C-407E-A947-70E740481C1C}">
+                <a14:useLocalDpi xmlns:a14="http://schemas.microsoft.com/office/drawing/2010/main" val="0"/>
+              </a:ext>
+            </a:extLst>
+          </a:blip>
+          <a:srcRect l="-17459" r="-17459"/>
+          <a:stretch>
+            <a:fillRect/>
+          </a:stretch>
+        </p:blipFill>
         <p:spPr/>
-        <p:txBody>
-          <a:bodyPr/>
+      </p:pic>
+      <p:sp>
+        <p:nvSpPr>
+          <p:cNvPr id="5" name="TextBox 4"/>
+          <p:cNvSpPr txBox="1"/>
+          <p:nvPr/>
+        </p:nvSpPr>
+        <p:spPr>
+          <a:xfrm>
+            <a:off x="0" y="6211669"/>
+            <a:ext cx="8545213" cy="646331"/>
+          </a:xfrm>
+          <a:prstGeom prst="rect">
+            <a:avLst/>
+          </a:prstGeom>
+          <a:noFill/>
+        </p:spPr>
+        <p:txBody>
+          <a:bodyPr wrap="square" rtlCol="0">
+            <a:spAutoFit/>
+          </a:bodyPr>
           <a:lstStyle/>
           <a:p>
             <a:r>
               <a:rPr lang="en-US" dirty="0"/>
-              <a:t>What does it do?</a:t>
-            </a:r>
-          </a:p>
-          <a:p>
-            <a:pPr lvl="1"/>
-            <a:r>
-              <a:rPr lang="en-US" dirty="0"/>
-              <a:t>Visualize sequencing coverage achieved across samples</a:t>
-            </a:r>
-          </a:p>
-          <a:p>
-            <a:r>
-              <a:rPr lang="en-US" dirty="0"/>
-              <a:t>Why do we care?</a:t>
-            </a:r>
-          </a:p>
-          <a:p>
-            <a:pPr lvl="1"/>
-            <a:r>
-              <a:rPr lang="en-US" dirty="0"/>
-              <a:t>Immediately identify if a sample has failed sequencing or has not achieved the expected sequencing depth</a:t>
-            </a:r>
-          </a:p>
-          <a:p>
-            <a:pPr marL="0" indent="0">
-              <a:buNone/>
-            </a:pPr>
-            <a:endParaRPr lang="en-US" dirty="0"/>
+              <a:t>Fig. 2: “Comprehensive genomic analysis reveals FLT3 activation and a therapeutic strategy for a patient with relapsed adult B-lymphoblastic leukemia”</a:t>
+            </a:r>
           </a:p>
         </p:txBody>
       </p:sp>
     </p:spTree>
     <p:extLst>
       <p:ext uri="{BB962C8B-B14F-4D97-AF65-F5344CB8AC3E}">
-        <p14:creationId xmlns:p14="http://schemas.microsoft.com/office/powerpoint/2010/main" val="2377974737"/>
+        <p14:creationId xmlns:p14="http://schemas.microsoft.com/office/powerpoint/2010/main" val="3978966196"/>
       </p:ext>
     </p:extLst>
   </p:cSld>
   <p:clrMapOvr>
     <a:masterClrMapping/>
   </p:clrMapOvr>
-  <p:timing>
-    <p:tnLst>
-      <p:par>
-        <p:cTn xmlns:p14="http://schemas.microsoft.com/office/powerpoint/2010/main" id="1" dur="indefinite" restart="never" nodeType="tmRoot"/>
-      </p:par>
-    </p:tnLst>
-  </p:timing>
 </p:sld>
 </file>
 
@@ -4422,87 +4503,76 @@
           <a:lstStyle/>
           <a:p>
             <a:r>
-              <a:rPr lang="en-US" dirty="0" err="1" smtClean="0"/>
+              <a:rPr lang="en-US" dirty="0" err="1"/>
               <a:t>GenVisR</a:t>
             </a:r>
             <a:r>
-              <a:rPr lang="en-US" dirty="0" smtClean="0"/>
+              <a:rPr lang="en-US" dirty="0"/>
               <a:t>::</a:t>
             </a:r>
             <a:r>
-              <a:rPr lang="en-US" dirty="0" err="1" smtClean="0"/>
+              <a:rPr lang="en-US" dirty="0" err="1"/>
               <a:t>covBars</a:t>
             </a:r>
             <a:r>
-              <a:rPr lang="en-US" dirty="0" smtClean="0"/>
+              <a:rPr lang="en-US" dirty="0"/>
               <a:t>()</a:t>
             </a:r>
+          </a:p>
+        </p:txBody>
+      </p:sp>
+      <p:sp>
+        <p:nvSpPr>
+          <p:cNvPr id="3" name="Content Placeholder 2"/>
+          <p:cNvSpPr>
+            <a:spLocks noGrp="1"/>
+          </p:cNvSpPr>
+          <p:nvPr>
+            <p:ph idx="1"/>
+          </p:nvPr>
+        </p:nvSpPr>
+        <p:spPr/>
+        <p:txBody>
+          <a:bodyPr/>
+          <a:lstStyle/>
+          <a:p>
+            <a:r>
+              <a:rPr lang="en-US" dirty="0"/>
+              <a:t>What does it do?</a:t>
+            </a:r>
+          </a:p>
+          <a:p>
+            <a:pPr lvl="1"/>
+            <a:r>
+              <a:rPr lang="en-US" dirty="0"/>
+              <a:t>Visualize sequencing coverage achieved across samples</a:t>
+            </a:r>
+          </a:p>
+          <a:p>
+            <a:r>
+              <a:rPr lang="en-US" dirty="0"/>
+              <a:t>Why do we care?</a:t>
+            </a:r>
+          </a:p>
+          <a:p>
+            <a:pPr lvl="1"/>
+            <a:r>
+              <a:rPr lang="en-US" dirty="0"/>
+              <a:t>Immediately identify if a sample has failed sequencing or has not achieved the expected sequencing depth</a:t>
+            </a:r>
+          </a:p>
+          <a:p>
+            <a:pPr marL="0" indent="0">
+              <a:buNone/>
+            </a:pPr>
             <a:endParaRPr lang="en-US" dirty="0"/>
-          </a:p>
-        </p:txBody>
-      </p:sp>
-      <p:pic>
-        <p:nvPicPr>
-          <p:cNvPr id="5" name="Content Placeholder 3" descr="Figure S03 - Coverage Summary.png"/>
-          <p:cNvPicPr>
-            <a:picLocks noGrp="1" noChangeAspect="1"/>
-          </p:cNvPicPr>
-          <p:nvPr>
-            <p:ph idx="1"/>
-          </p:nvPr>
-        </p:nvPicPr>
-        <p:blipFill>
-          <a:blip r:embed="rId3">
-            <a:extLst>
-              <a:ext uri="{28A0092B-C50C-407E-A947-70E740481C1C}">
-                <a14:useLocalDpi xmlns:a14="http://schemas.microsoft.com/office/drawing/2010/main" val="0"/>
-              </a:ext>
-            </a:extLst>
-          </a:blip>
-          <a:srcRect l="-45235" r="-45235"/>
-          <a:stretch>
-            <a:fillRect/>
-          </a:stretch>
-        </p:blipFill>
-        <p:spPr/>
-      </p:pic>
-      <p:sp>
-        <p:nvSpPr>
-          <p:cNvPr id="6" name="TextBox 5"/>
-          <p:cNvSpPr txBox="1"/>
-          <p:nvPr/>
-        </p:nvSpPr>
-        <p:spPr>
-          <a:xfrm>
-            <a:off x="0" y="6211669"/>
-            <a:ext cx="8545213" cy="646331"/>
-          </a:xfrm>
-          <a:prstGeom prst="rect">
-            <a:avLst/>
-          </a:prstGeom>
-          <a:noFill/>
-        </p:spPr>
-        <p:txBody>
-          <a:bodyPr wrap="square" rtlCol="0">
-            <a:spAutoFit/>
-          </a:bodyPr>
-          <a:lstStyle/>
-          <a:p>
-            <a:r>
-              <a:rPr lang="en-US" dirty="0" smtClean="0"/>
-              <a:t>Supp. Fig. </a:t>
-            </a:r>
-            <a:r>
-              <a:rPr lang="en-US" dirty="0"/>
-              <a:t>3: “Comprehensive genomic analysis reveals FLT3 activation and a therapeutic strategy for a patient with relapsed adult B-lymphoblastic leukemia”</a:t>
-            </a:r>
           </a:p>
         </p:txBody>
       </p:sp>
     </p:spTree>
     <p:extLst>
       <p:ext uri="{BB962C8B-B14F-4D97-AF65-F5344CB8AC3E}">
-        <p14:creationId xmlns:p14="http://schemas.microsoft.com/office/powerpoint/2010/main" val="3678410961"/>
+        <p14:creationId xmlns:p14="http://schemas.microsoft.com/office/powerpoint/2010/main" val="2377974737"/>
       </p:ext>
     </p:extLst>
   </p:cSld>
@@ -4531,158 +4601,209 @@
       </p:grpSpPr>
       <p:sp>
         <p:nvSpPr>
-          <p:cNvPr id="2" name="Title 1"/>
-          <p:cNvSpPr>
-            <a:spLocks noGrp="1"/>
-          </p:cNvSpPr>
-          <p:nvPr>
-            <p:ph type="title"/>
-          </p:nvPr>
-        </p:nvSpPr>
-        <p:spPr/>
-        <p:txBody>
-          <a:bodyPr/>
+          <p:cNvPr id="5" name="Rectangle 4"/>
+          <p:cNvSpPr/>
+          <p:nvPr/>
+        </p:nvSpPr>
+        <p:spPr>
+          <a:xfrm>
+            <a:off x="0" y="0"/>
+            <a:ext cx="9143999" cy="168318"/>
+          </a:xfrm>
+          <a:prstGeom prst="rect">
+            <a:avLst/>
+          </a:prstGeom>
+          <a:solidFill>
+            <a:srgbClr val="F9F9F9"/>
+          </a:solidFill>
+          <a:ln>
+            <a:solidFill>
+              <a:srgbClr val="FFFFFF"/>
+            </a:solidFill>
+          </a:ln>
+          <a:effectLst/>
+        </p:spPr>
+        <p:style>
+          <a:lnRef idx="1">
+            <a:schemeClr val="accent1"/>
+          </a:lnRef>
+          <a:fillRef idx="3">
+            <a:schemeClr val="accent1"/>
+          </a:fillRef>
+          <a:effectRef idx="2">
+            <a:schemeClr val="accent1"/>
+          </a:effectRef>
+          <a:fontRef idx="minor">
+            <a:schemeClr val="lt1"/>
+          </a:fontRef>
+        </p:style>
+        <p:txBody>
+          <a:bodyPr rtlCol="0" anchor="ctr"/>
           <a:lstStyle/>
           <a:p>
-            <a:r>
-              <a:rPr lang="en-US" dirty="0" smtClean="0"/>
-              <a:t>Learning objectives of the course</a:t>
-            </a:r>
-            <a:endParaRPr lang="en-US" dirty="0"/>
-          </a:p>
-        </p:txBody>
-      </p:sp>
-      <p:sp>
-        <p:nvSpPr>
-          <p:cNvPr id="3" name="Content Placeholder 2"/>
-          <p:cNvSpPr>
-            <a:spLocks noGrp="1"/>
-          </p:cNvSpPr>
-          <p:nvPr>
-            <p:ph idx="1"/>
-          </p:nvPr>
-        </p:nvSpPr>
-        <p:spPr/>
-        <p:txBody>
-          <a:bodyPr>
-            <a:normAutofit fontScale="92500"/>
-          </a:bodyPr>
-          <a:lstStyle/>
-          <a:p>
-            <a:r>
-              <a:rPr lang="en-US" dirty="0" smtClean="0"/>
-              <a:t>Module 1: </a:t>
-            </a:r>
-            <a:r>
-              <a:rPr lang="en-US" dirty="0"/>
-              <a:t>Introduction to genomic data visualization and interpretation</a:t>
-            </a:r>
-            <a:endParaRPr lang="en-US" dirty="0" smtClean="0"/>
-          </a:p>
-          <a:p>
-            <a:r>
-              <a:rPr lang="en-US" dirty="0" smtClean="0"/>
-              <a:t>Module 2</a:t>
-            </a:r>
-            <a:r>
-              <a:rPr lang="en-US" dirty="0"/>
-              <a:t>: Using R for genomic data visualization and </a:t>
-            </a:r>
-            <a:r>
-              <a:rPr lang="en-US" dirty="0" smtClean="0"/>
-              <a:t>interpretation</a:t>
-            </a:r>
-          </a:p>
-          <a:p>
-            <a:r>
-              <a:rPr lang="en-US" b="1" dirty="0" smtClean="0"/>
-              <a:t>Module 3: </a:t>
-            </a:r>
-            <a:r>
-              <a:rPr lang="en-US" b="1" dirty="0"/>
-              <a:t>Introduction to </a:t>
-            </a:r>
-            <a:r>
-              <a:rPr lang="en-US" b="1" dirty="0" err="1" smtClean="0"/>
-              <a:t>GenVisR</a:t>
-            </a:r>
-            <a:endParaRPr lang="en-US" b="1" dirty="0" smtClean="0"/>
-          </a:p>
-          <a:p>
-            <a:r>
-              <a:rPr lang="en-US" dirty="0"/>
-              <a:t>Module 4: Expression profiling, visualization, and interpretation</a:t>
-            </a:r>
-            <a:endParaRPr lang="en-US" dirty="0" smtClean="0"/>
-          </a:p>
-          <a:p>
-            <a:r>
-              <a:rPr lang="en-US" dirty="0" smtClean="0"/>
-              <a:t>Module 5</a:t>
-            </a:r>
-            <a:r>
-              <a:rPr lang="en-US" dirty="0"/>
-              <a:t>: Variant annotation and interpretation</a:t>
-            </a:r>
-            <a:endParaRPr lang="en-US" dirty="0" smtClean="0"/>
-          </a:p>
-          <a:p>
-            <a:r>
-              <a:rPr lang="en-US" dirty="0" smtClean="0"/>
-              <a:t>Module 6</a:t>
-            </a:r>
-            <a:r>
-              <a:rPr lang="en-US" dirty="0"/>
-              <a:t>: Q &amp; A, discussion, integrated assignments, and working with your own </a:t>
-            </a:r>
-            <a:r>
-              <a:rPr lang="en-US" dirty="0" smtClean="0"/>
-              <a:t>data</a:t>
-            </a:r>
-          </a:p>
-          <a:p>
-            <a:endParaRPr lang="en-US" dirty="0"/>
-          </a:p>
-          <a:p>
-            <a:r>
-              <a:rPr lang="en-US" dirty="0" smtClean="0"/>
-              <a:t>Tutorials</a:t>
-            </a:r>
-          </a:p>
-          <a:p>
-            <a:pPr lvl="1"/>
-            <a:r>
-              <a:rPr lang="en-US" dirty="0" smtClean="0"/>
-              <a:t>Provide working examples of data visualization and interpretation</a:t>
-            </a:r>
-          </a:p>
-          <a:p>
-            <a:pPr lvl="1"/>
-            <a:r>
-              <a:rPr lang="en-US" dirty="0" smtClean="0"/>
-              <a:t>Self contained, self explanatory, portable </a:t>
-            </a:r>
-            <a:endParaRPr lang="en-US" dirty="0"/>
-          </a:p>
-        </p:txBody>
-      </p:sp>
+            <a:pPr algn="ctr"/>
+            <a:endParaRPr lang="en-US"/>
+          </a:p>
+        </p:txBody>
+      </p:sp>
+      <p:pic>
+        <p:nvPicPr>
+          <p:cNvPr id="4" name="Picture 3" descr="CC-BY-SA 4.0.png"/>
+          <p:cNvPicPr>
+            <a:picLocks noChangeAspect="1"/>
+          </p:cNvPicPr>
+          <p:nvPr/>
+        </p:nvPicPr>
+        <p:blipFill>
+          <a:blip r:embed="rId3">
+            <a:extLst>
+              <a:ext uri="{28A0092B-C50C-407E-A947-70E740481C1C}">
+                <a14:useLocalDpi xmlns:a14="http://schemas.microsoft.com/office/drawing/2010/main" val="0"/>
+              </a:ext>
+            </a:extLst>
+          </a:blip>
+          <a:stretch>
+            <a:fillRect/>
+          </a:stretch>
+        </p:blipFill>
+        <p:spPr>
+          <a:xfrm>
+            <a:off x="1739900" y="0"/>
+            <a:ext cx="5650156" cy="6858000"/>
+          </a:xfrm>
+          <a:prstGeom prst="rect">
+            <a:avLst/>
+          </a:prstGeom>
+        </p:spPr>
+      </p:pic>
     </p:spTree>
     <p:extLst>
       <p:ext uri="{BB962C8B-B14F-4D97-AF65-F5344CB8AC3E}">
-        <p14:creationId xmlns:p14="http://schemas.microsoft.com/office/powerpoint/2010/main" val="135940326"/>
+        <p14:creationId xmlns:p14="http://schemas.microsoft.com/office/powerpoint/2010/main" val="4031557169"/>
       </p:ext>
     </p:extLst>
   </p:cSld>
   <p:clrMapOvr>
     <a:masterClrMapping/>
   </p:clrMapOvr>
-  <p:timing>
-    <p:tnLst>
-      <p:par>
-        <p:cTn xmlns:p14="http://schemas.microsoft.com/office/powerpoint/2010/main" id="1" dur="indefinite" restart="never" nodeType="tmRoot"/>
-      </p:par>
-    </p:tnLst>
-  </p:timing>
+</p:sld>
+</file>
+
+<file path=ppt/slides/slide20.xml><?xml version="1.0" encoding="utf-8"?>
+<p:sld xmlns:a="http://schemas.openxmlformats.org/drawingml/2006/main" xmlns:r="http://schemas.openxmlformats.org/officeDocument/2006/relationships" xmlns:p="http://schemas.openxmlformats.org/presentationml/2006/main">
+  <p:cSld>
+    <p:spTree>
+      <p:nvGrpSpPr>
+        <p:cNvPr id="1" name=""/>
+        <p:cNvGrpSpPr/>
+        <p:nvPr/>
+      </p:nvGrpSpPr>
+      <p:grpSpPr>
+        <a:xfrm>
+          <a:off x="0" y="0"/>
+          <a:ext cx="0" cy="0"/>
+          <a:chOff x="0" y="0"/>
+          <a:chExt cx="0" cy="0"/>
+        </a:xfrm>
+      </p:grpSpPr>
+      <p:sp>
+        <p:nvSpPr>
+          <p:cNvPr id="2" name="Title 1"/>
+          <p:cNvSpPr>
+            <a:spLocks noGrp="1"/>
+          </p:cNvSpPr>
+          <p:nvPr>
+            <p:ph type="title"/>
+          </p:nvPr>
+        </p:nvSpPr>
+        <p:spPr/>
+        <p:txBody>
+          <a:bodyPr/>
+          <a:lstStyle/>
+          <a:p>
+            <a:r>
+              <a:rPr lang="en-US" dirty="0" err="1"/>
+              <a:t>GenVisR</a:t>
+            </a:r>
+            <a:r>
+              <a:rPr lang="en-US" dirty="0"/>
+              <a:t>::</a:t>
+            </a:r>
+            <a:r>
+              <a:rPr lang="en-US" dirty="0" err="1"/>
+              <a:t>covBars</a:t>
+            </a:r>
+            <a:r>
+              <a:rPr lang="en-US" dirty="0"/>
+              <a:t>()</a:t>
+            </a:r>
+          </a:p>
+        </p:txBody>
+      </p:sp>
+      <p:pic>
+        <p:nvPicPr>
+          <p:cNvPr id="5" name="Content Placeholder 3" descr="Figure S03 - Coverage Summary.png"/>
+          <p:cNvPicPr>
+            <a:picLocks noGrp="1" noChangeAspect="1"/>
+          </p:cNvPicPr>
+          <p:nvPr>
+            <p:ph idx="1"/>
+          </p:nvPr>
+        </p:nvPicPr>
+        <p:blipFill>
+          <a:blip r:embed="rId3">
+            <a:extLst>
+              <a:ext uri="{28A0092B-C50C-407E-A947-70E740481C1C}">
+                <a14:useLocalDpi xmlns:a14="http://schemas.microsoft.com/office/drawing/2010/main" val="0"/>
+              </a:ext>
+            </a:extLst>
+          </a:blip>
+          <a:srcRect l="-45235" r="-45235"/>
+          <a:stretch>
+            <a:fillRect/>
+          </a:stretch>
+        </p:blipFill>
+        <p:spPr/>
+      </p:pic>
+      <p:sp>
+        <p:nvSpPr>
+          <p:cNvPr id="6" name="TextBox 5"/>
+          <p:cNvSpPr txBox="1"/>
+          <p:nvPr/>
+        </p:nvSpPr>
+        <p:spPr>
+          <a:xfrm>
+            <a:off x="0" y="6211669"/>
+            <a:ext cx="8545213" cy="646331"/>
+          </a:xfrm>
+          <a:prstGeom prst="rect">
+            <a:avLst/>
+          </a:prstGeom>
+          <a:noFill/>
+        </p:spPr>
+        <p:txBody>
+          <a:bodyPr wrap="square" rtlCol="0">
+            <a:spAutoFit/>
+          </a:bodyPr>
+          <a:lstStyle/>
+          <a:p>
+            <a:r>
+              <a:rPr lang="en-US" dirty="0"/>
+              <a:t>Supp. Fig. 3: “Comprehensive genomic analysis reveals FLT3 activation and a therapeutic strategy for a patient with relapsed adult B-lymphoblastic leukemia”</a:t>
+            </a:r>
+          </a:p>
+        </p:txBody>
+      </p:sp>
+    </p:spTree>
+    <p:extLst>
+      <p:ext uri="{BB962C8B-B14F-4D97-AF65-F5344CB8AC3E}">
+        <p14:creationId xmlns:p14="http://schemas.microsoft.com/office/powerpoint/2010/main" val="3678410961"/>
+      </p:ext>
+    </p:extLst>
+  </p:cSld>
+  <p:clrMapOvr>
+    <a:masterClrMapping/>
+  </p:clrMapOvr>
 </p:sld>
 </file>
 
@@ -4719,192 +4840,104 @@
           <a:lstStyle/>
           <a:p>
             <a:r>
-              <a:rPr lang="en-US" dirty="0" smtClean="0"/>
-              <a:t>Learning objectives of module 3</a:t>
-            </a:r>
+              <a:rPr lang="en-US" dirty="0"/>
+              <a:t>Learning objectives of the course</a:t>
+            </a:r>
+          </a:p>
+        </p:txBody>
+      </p:sp>
+      <p:sp>
+        <p:nvSpPr>
+          <p:cNvPr id="3" name="Content Placeholder 2"/>
+          <p:cNvSpPr>
+            <a:spLocks noGrp="1"/>
+          </p:cNvSpPr>
+          <p:nvPr>
+            <p:ph idx="1"/>
+          </p:nvPr>
+        </p:nvSpPr>
+        <p:spPr/>
+        <p:txBody>
+          <a:bodyPr>
+            <a:normAutofit fontScale="92500"/>
+          </a:bodyPr>
+          <a:lstStyle/>
+          <a:p>
+            <a:r>
+              <a:rPr lang="en-US" dirty="0"/>
+              <a:t>Module 1: Introduction to genomic data visualization and interpretation</a:t>
+            </a:r>
+          </a:p>
+          <a:p>
+            <a:r>
+              <a:rPr lang="en-US" dirty="0"/>
+              <a:t>Module 2: Using R for genomic data visualization and interpretation</a:t>
+            </a:r>
+          </a:p>
+          <a:p>
+            <a:r>
+              <a:rPr lang="en-US" b="1" dirty="0"/>
+              <a:t>Module 3: Introduction to </a:t>
+            </a:r>
+            <a:r>
+              <a:rPr lang="en-US" b="1" dirty="0" err="1"/>
+              <a:t>GenVisR</a:t>
+            </a:r>
+            <a:endParaRPr lang="en-US" b="1" dirty="0"/>
+          </a:p>
+          <a:p>
+            <a:r>
+              <a:rPr lang="en-US" dirty="0"/>
+              <a:t>Module 4: Expression profiling, visualization, and interpretation</a:t>
+            </a:r>
+          </a:p>
+          <a:p>
+            <a:r>
+              <a:rPr lang="en-US" dirty="0"/>
+              <a:t>Module 5: Variant annotation and interpretation</a:t>
+            </a:r>
+          </a:p>
+          <a:p>
+            <a:r>
+              <a:rPr lang="en-US" dirty="0"/>
+              <a:t>Module 6: Q &amp; A, discussion, integrated assignments, and working with your own data</a:t>
+            </a:r>
+          </a:p>
+          <a:p>
             <a:endParaRPr lang="en-US" dirty="0"/>
           </a:p>
-        </p:txBody>
-      </p:sp>
-      <p:sp>
-        <p:nvSpPr>
-          <p:cNvPr id="3" name="Content Placeholder 2"/>
-          <p:cNvSpPr>
-            <a:spLocks noGrp="1"/>
-          </p:cNvSpPr>
-          <p:nvPr>
-            <p:ph idx="1"/>
-          </p:nvPr>
-        </p:nvSpPr>
-        <p:spPr/>
-        <p:txBody>
-          <a:bodyPr/>
-          <a:lstStyle/>
-          <a:p>
-            <a:r>
-              <a:rPr lang="en-US" dirty="0"/>
-              <a:t>Introduction to </a:t>
-            </a:r>
-            <a:r>
-              <a:rPr lang="en-US" dirty="0" err="1" smtClean="0"/>
-              <a:t>GenVisR</a:t>
-            </a:r>
-            <a:endParaRPr lang="en-US" dirty="0"/>
+          <a:p>
+            <a:r>
+              <a:rPr lang="en-US" dirty="0"/>
+              <a:t>Tutorials</a:t>
+            </a:r>
           </a:p>
           <a:p>
             <a:pPr lvl="1"/>
             <a:r>
-              <a:rPr lang="en-US" dirty="0" smtClean="0"/>
-              <a:t>Creation and interpretation of </a:t>
-            </a:r>
-            <a:r>
-              <a:rPr lang="en-US" dirty="0" err="1" smtClean="0"/>
-              <a:t>GenVisR</a:t>
-            </a:r>
-            <a:r>
-              <a:rPr lang="en-US" dirty="0" smtClean="0"/>
-              <a:t> plots</a:t>
-            </a:r>
-          </a:p>
-          <a:p>
-            <a:pPr lvl="2"/>
-            <a:r>
-              <a:rPr lang="en-US" dirty="0"/>
-              <a:t>w</a:t>
-            </a:r>
-            <a:r>
-              <a:rPr lang="en-US" dirty="0" smtClean="0"/>
-              <a:t>aterfall()</a:t>
-            </a:r>
-          </a:p>
-          <a:p>
-            <a:pPr lvl="2"/>
-            <a:r>
-              <a:rPr lang="en-US" dirty="0" err="1" smtClean="0"/>
-              <a:t>TvTi</a:t>
-            </a:r>
-            <a:r>
-              <a:rPr lang="en-US" dirty="0" smtClean="0"/>
-              <a:t>()</a:t>
-            </a:r>
-          </a:p>
-          <a:p>
-            <a:pPr lvl="2"/>
-            <a:r>
-              <a:rPr lang="en-US" dirty="0" err="1" smtClean="0"/>
-              <a:t>genCov</a:t>
-            </a:r>
-            <a:r>
-              <a:rPr lang="en-US" dirty="0" smtClean="0"/>
-              <a:t>()</a:t>
-            </a:r>
-          </a:p>
-          <a:p>
-            <a:pPr lvl="2"/>
-            <a:r>
-              <a:rPr lang="en-US" dirty="0" err="1" smtClean="0"/>
-              <a:t>cnFreq</a:t>
-            </a:r>
-            <a:r>
-              <a:rPr lang="en-US" dirty="0" smtClean="0"/>
-              <a:t>()</a:t>
-            </a:r>
-          </a:p>
-          <a:p>
-            <a:pPr lvl="2"/>
-            <a:r>
-              <a:rPr lang="en-US" dirty="0" err="1" smtClean="0"/>
-              <a:t>cnSpec</a:t>
-            </a:r>
-            <a:r>
-              <a:rPr lang="en-US" dirty="0" smtClean="0"/>
-              <a:t>()</a:t>
-            </a:r>
-          </a:p>
-          <a:p>
-            <a:pPr lvl="2"/>
-            <a:r>
-              <a:rPr lang="en-US" dirty="0" err="1" smtClean="0"/>
-              <a:t>lohSpec</a:t>
-            </a:r>
-            <a:r>
-              <a:rPr lang="en-US" dirty="0" smtClean="0"/>
-              <a:t>()</a:t>
-            </a:r>
-          </a:p>
-          <a:p>
-            <a:pPr lvl="2"/>
-            <a:r>
-              <a:rPr lang="en-US" dirty="0" err="1" smtClean="0"/>
-              <a:t>covBars</a:t>
-            </a:r>
-            <a:r>
-              <a:rPr lang="en-US" dirty="0" smtClean="0"/>
-              <a:t>()</a:t>
+              <a:rPr lang="en-US" dirty="0"/>
+              <a:t>Provide working examples of data visualization and interpretation</a:t>
             </a:r>
           </a:p>
           <a:p>
             <a:pPr lvl="1"/>
             <a:r>
-              <a:rPr lang="en-US" dirty="0" smtClean="0"/>
-              <a:t>Adding plot layers to </a:t>
-            </a:r>
-            <a:r>
-              <a:rPr lang="en-US" dirty="0" err="1" smtClean="0"/>
-              <a:t>GenVisR</a:t>
-            </a:r>
-            <a:r>
-              <a:rPr lang="en-US" dirty="0" smtClean="0"/>
-              <a:t> </a:t>
-            </a:r>
-          </a:p>
-          <a:p>
-            <a:pPr lvl="1"/>
-            <a:r>
-              <a:rPr lang="en-US" dirty="0" smtClean="0"/>
-              <a:t>Arranging viewports with </a:t>
-            </a:r>
-            <a:r>
-              <a:rPr lang="en-US" dirty="0" err="1" smtClean="0"/>
-              <a:t>gridExtra</a:t>
-            </a:r>
-            <a:endParaRPr lang="en-US" dirty="0" smtClean="0"/>
-          </a:p>
-          <a:p>
-            <a:pPr lvl="1"/>
-            <a:r>
-              <a:rPr lang="en-US" dirty="0" smtClean="0"/>
-              <a:t>Aligning viewports with </a:t>
-            </a:r>
-            <a:r>
-              <a:rPr lang="en-US" dirty="0" err="1" smtClean="0"/>
-              <a:t>gtable</a:t>
-            </a:r>
-            <a:endParaRPr lang="en-US" dirty="0" smtClean="0"/>
-          </a:p>
-          <a:p>
-            <a:pPr lvl="2"/>
-            <a:endParaRPr lang="en-US" dirty="0"/>
+              <a:rPr lang="en-US" dirty="0"/>
+              <a:t>Self contained, self explanatory, portable </a:t>
+            </a:r>
           </a:p>
         </p:txBody>
       </p:sp>
     </p:spTree>
     <p:extLst>
       <p:ext uri="{BB962C8B-B14F-4D97-AF65-F5344CB8AC3E}">
-        <p14:creationId xmlns:p14="http://schemas.microsoft.com/office/powerpoint/2010/main" val="426510709"/>
+        <p14:creationId xmlns:p14="http://schemas.microsoft.com/office/powerpoint/2010/main" val="135940326"/>
       </p:ext>
     </p:extLst>
   </p:cSld>
   <p:clrMapOvr>
     <a:masterClrMapping/>
   </p:clrMapOvr>
-  <p:timing>
-    <p:tnLst>
-      <p:par>
-        <p:cTn xmlns:p14="http://schemas.microsoft.com/office/powerpoint/2010/main" id="1" dur="indefinite" restart="never" nodeType="tmRoot"/>
-      </p:par>
-    </p:tnLst>
-  </p:timing>
 </p:sld>
 </file>
 
@@ -4942,100 +4975,165 @@
           <a:p>
             <a:r>
               <a:rPr lang="en-US" dirty="0"/>
-              <a:t>What is </a:t>
+              <a:t>Learning objectives of module 3</a:t>
+            </a:r>
+          </a:p>
+        </p:txBody>
+      </p:sp>
+      <p:sp>
+        <p:nvSpPr>
+          <p:cNvPr id="3" name="Content Placeholder 2"/>
+          <p:cNvSpPr>
+            <a:spLocks noGrp="1"/>
+          </p:cNvSpPr>
+          <p:nvPr>
+            <p:ph idx="1"/>
+          </p:nvPr>
+        </p:nvSpPr>
+        <p:spPr/>
+        <p:txBody>
+          <a:bodyPr/>
+          <a:lstStyle/>
+          <a:p>
+            <a:r>
+              <a:rPr lang="en-US" dirty="0"/>
+              <a:t>Introduction to </a:t>
             </a:r>
             <a:r>
               <a:rPr lang="en-US" dirty="0" err="1"/>
               <a:t>GenVisR</a:t>
             </a:r>
-            <a:r>
-              <a:rPr lang="en-US" dirty="0"/>
-              <a:t>?</a:t>
-            </a:r>
-          </a:p>
-        </p:txBody>
-      </p:sp>
-      <p:sp>
-        <p:nvSpPr>
-          <p:cNvPr id="3" name="Content Placeholder 2"/>
-          <p:cNvSpPr>
-            <a:spLocks noGrp="1"/>
-          </p:cNvSpPr>
-          <p:nvPr>
-            <p:ph idx="1"/>
-          </p:nvPr>
-        </p:nvSpPr>
-        <p:spPr/>
-        <p:txBody>
-          <a:bodyPr/>
-          <a:lstStyle/>
-          <a:p>
-            <a:r>
-              <a:rPr lang="en-US" dirty="0"/>
-              <a:t>Provides a toolkit for visualizing Genomic data</a:t>
-            </a:r>
-          </a:p>
-          <a:p>
-            <a:r>
-              <a:rPr lang="en-US" dirty="0"/>
-              <a:t>Implemented in R</a:t>
-            </a:r>
-          </a:p>
-          <a:p>
-            <a:r>
-              <a:rPr lang="en-US" dirty="0"/>
-              <a:t>Emphasis on producing “publication quality” graphics with a minimal amount of user input.</a:t>
-            </a:r>
-          </a:p>
-          <a:p>
-            <a:r>
-              <a:rPr lang="en-US" dirty="0"/>
-              <a:t>Part of </a:t>
+            <a:endParaRPr lang="en-US" dirty="0"/>
+          </a:p>
+          <a:p>
+            <a:pPr lvl="1"/>
+            <a:r>
+              <a:rPr lang="en-US" dirty="0"/>
+              <a:t>Creation and interpretation of </a:t>
             </a:r>
             <a:r>
               <a:rPr lang="en-US" dirty="0" err="1"/>
-              <a:t>bioconductor</a:t>
+              <a:t>GenVisR</a:t>
+            </a:r>
+            <a:r>
+              <a:rPr lang="en-US" dirty="0"/>
+              <a:t> plots</a:t>
+            </a:r>
+          </a:p>
+          <a:p>
+            <a:pPr lvl="2"/>
+            <a:r>
+              <a:rPr lang="en-US" dirty="0"/>
+              <a:t>waterfall()</a:t>
+            </a:r>
+          </a:p>
+          <a:p>
+            <a:pPr lvl="2"/>
+            <a:r>
+              <a:rPr lang="en-US" dirty="0" err="1"/>
+              <a:t>TvTi</a:t>
+            </a:r>
+            <a:r>
+              <a:rPr lang="en-US" dirty="0"/>
+              <a:t>()</a:t>
+            </a:r>
+          </a:p>
+          <a:p>
+            <a:pPr lvl="2"/>
+            <a:r>
+              <a:rPr lang="en-US" dirty="0" err="1"/>
+              <a:t>genCov</a:t>
+            </a:r>
+            <a:r>
+              <a:rPr lang="en-US" dirty="0"/>
+              <a:t>()</a:t>
+            </a:r>
+          </a:p>
+          <a:p>
+            <a:pPr lvl="2"/>
+            <a:r>
+              <a:rPr lang="en-US" dirty="0" err="1"/>
+              <a:t>cnFreq</a:t>
+            </a:r>
+            <a:r>
+              <a:rPr lang="en-US" dirty="0"/>
+              <a:t>()</a:t>
+            </a:r>
+          </a:p>
+          <a:p>
+            <a:pPr lvl="2"/>
+            <a:r>
+              <a:rPr lang="en-US" dirty="0" err="1"/>
+              <a:t>cnSpec</a:t>
+            </a:r>
+            <a:r>
+              <a:rPr lang="en-US" dirty="0"/>
+              <a:t>()</a:t>
+            </a:r>
+          </a:p>
+          <a:p>
+            <a:pPr lvl="2"/>
+            <a:r>
+              <a:rPr lang="en-US" dirty="0" err="1"/>
+              <a:t>lohSpec</a:t>
+            </a:r>
+            <a:r>
+              <a:rPr lang="en-US" dirty="0"/>
+              <a:t>()</a:t>
+            </a:r>
+          </a:p>
+          <a:p>
+            <a:pPr lvl="2"/>
+            <a:r>
+              <a:rPr lang="en-US" dirty="0" err="1"/>
+              <a:t>covBars</a:t>
+            </a:r>
+            <a:r>
+              <a:rPr lang="en-US" dirty="0"/>
+              <a:t>()</a:t>
+            </a:r>
+          </a:p>
+          <a:p>
+            <a:pPr lvl="1"/>
+            <a:r>
+              <a:rPr lang="en-US" dirty="0"/>
+              <a:t>Adding plot layers to </a:t>
+            </a:r>
+            <a:r>
+              <a:rPr lang="en-US" dirty="0" err="1"/>
+              <a:t>GenVisR</a:t>
+            </a:r>
+            <a:r>
+              <a:rPr lang="en-US" dirty="0"/>
+              <a:t> </a:t>
+            </a:r>
+          </a:p>
+          <a:p>
+            <a:pPr lvl="1"/>
+            <a:r>
+              <a:rPr lang="en-US" dirty="0"/>
+              <a:t>Arranging viewports with </a:t>
+            </a:r>
+            <a:r>
+              <a:rPr lang="en-US" dirty="0" err="1"/>
+              <a:t>gridExtra</a:t>
             </a:r>
             <a:endParaRPr lang="en-US" dirty="0"/>
           </a:p>
           <a:p>
             <a:pPr lvl="1"/>
             <a:r>
-              <a:rPr lang="en-US" dirty="0">
-                <a:hlinkClick r:id="rId2"/>
-              </a:rPr>
-              <a:t>https://www.bioconductor.org/packages/3.3/bioc/html/GenVisR.html</a:t>
+              <a:rPr lang="en-US" dirty="0"/>
+              <a:t>Aligning viewports with </a:t>
+            </a:r>
+            <a:r>
+              <a:rPr lang="en-US" dirty="0" err="1"/>
+              <a:t>gtable</a:t>
             </a:r>
             <a:endParaRPr lang="en-US" dirty="0"/>
           </a:p>
           <a:p>
-            <a:r>
-              <a:rPr lang="en-US" dirty="0"/>
-              <a:t>Active development on </a:t>
-            </a:r>
-            <a:r>
-              <a:rPr lang="en-US" dirty="0" err="1"/>
-              <a:t>github</a:t>
-            </a:r>
-            <a:endParaRPr lang="en-US" dirty="0"/>
-          </a:p>
-          <a:p>
-            <a:pPr lvl="1"/>
-            <a:r>
-              <a:rPr lang="en-US" dirty="0">
-                <a:hlinkClick r:id="rId3"/>
-              </a:rPr>
-              <a:t>https://github.com/griffithlab/GenVisR</a:t>
-            </a:r>
-            <a:endParaRPr lang="en-US" dirty="0"/>
-          </a:p>
-          <a:p>
-            <a:r>
-              <a:rPr lang="en-US" dirty="0"/>
-              <a:t>Functions focused in three areas “Small variants”, “Copy number alterations”, and “Data quality”</a:t>
-            </a:r>
-          </a:p>
-          <a:p>
+            <a:pPr lvl="2"/>
             <a:endParaRPr lang="en-US" dirty="0"/>
           </a:p>
         </p:txBody>
@@ -5043,7 +5141,7 @@
     </p:spTree>
     <p:extLst>
       <p:ext uri="{BB962C8B-B14F-4D97-AF65-F5344CB8AC3E}">
-        <p14:creationId xmlns:p14="http://schemas.microsoft.com/office/powerpoint/2010/main" val="1023695290"/>
+        <p14:creationId xmlns:p14="http://schemas.microsoft.com/office/powerpoint/2010/main" val="426510709"/>
       </p:ext>
     </p:extLst>
   </p:cSld>
@@ -5086,18 +5184,17 @@
           <a:lstStyle/>
           <a:p>
             <a:r>
-              <a:rPr lang="en-US" dirty="0" smtClean="0"/>
-              <a:t>Why </a:t>
-            </a:r>
-            <a:r>
-              <a:rPr lang="en-US" dirty="0" err="1" smtClean="0"/>
+              <a:rPr lang="en-US" dirty="0"/>
+              <a:t>What is </a:t>
+            </a:r>
+            <a:r>
+              <a:rPr lang="en-US" dirty="0" err="1"/>
               <a:t>GenVisR</a:t>
             </a:r>
             <a:r>
-              <a:rPr lang="en-US" dirty="0" smtClean="0"/>
+              <a:rPr lang="en-US" dirty="0"/>
               <a:t>?</a:t>
             </a:r>
-            <a:endParaRPr lang="en-US" dirty="0"/>
           </a:p>
         </p:txBody>
       </p:sp>
@@ -5117,97 +5214,71 @@
           <a:lstStyle/>
           <a:p>
             <a:r>
-              <a:rPr lang="en-US" dirty="0" smtClean="0"/>
-              <a:t>The </a:t>
-            </a:r>
-            <a:r>
-              <a:rPr lang="en-US" dirty="0"/>
-              <a:t>package is built upon </a:t>
-            </a:r>
-            <a:r>
-              <a:rPr lang="en-US" dirty="0" smtClean="0"/>
-              <a:t>ggplot2 and </a:t>
-            </a:r>
-            <a:r>
-              <a:rPr lang="en-US" dirty="0"/>
-              <a:t>will allow us to leverage information we've learned in previous modules</a:t>
-            </a:r>
-            <a:r>
-              <a:rPr lang="en-US" dirty="0" smtClean="0"/>
-              <a:t>.</a:t>
-            </a:r>
-          </a:p>
-          <a:p>
-            <a:r>
-              <a:rPr lang="en-US" dirty="0" smtClean="0"/>
-              <a:t>The </a:t>
-            </a:r>
-            <a:r>
-              <a:rPr lang="en-US" dirty="0"/>
-              <a:t>package is intended to be </a:t>
-            </a:r>
-            <a:r>
-              <a:rPr lang="en-US" dirty="0" smtClean="0"/>
-              <a:t>flexible, </a:t>
-            </a:r>
-            <a:r>
-              <a:rPr lang="en-US" dirty="0"/>
-              <a:t>supporting multiple file types, species, etc.</a:t>
-            </a:r>
-          </a:p>
-          <a:p>
-            <a:r>
-              <a:rPr lang="en-US" dirty="0" smtClean="0"/>
-              <a:t>The </a:t>
-            </a:r>
-            <a:r>
-              <a:rPr lang="en-US" dirty="0"/>
-              <a:t>package is relatively popular; </a:t>
-            </a:r>
-            <a:r>
-              <a:rPr lang="en-US" dirty="0" smtClean="0"/>
-              <a:t>In </a:t>
-            </a:r>
-            <a:r>
-              <a:rPr lang="en-US" dirty="0"/>
-              <a:t>the top 20% of </a:t>
-            </a:r>
-            <a:r>
-              <a:rPr lang="en-US" dirty="0" err="1" smtClean="0"/>
+              <a:rPr lang="en-US" dirty="0"/>
+              <a:t>Provides a toolkit for visualizing Genomic data</a:t>
+            </a:r>
+          </a:p>
+          <a:p>
+            <a:r>
+              <a:rPr lang="en-US" dirty="0"/>
+              <a:t>Implemented in R</a:t>
+            </a:r>
+          </a:p>
+          <a:p>
+            <a:r>
+              <a:rPr lang="en-US" dirty="0"/>
+              <a:t>Emphasis on producing “publication quality” graphics with a minimal amount of user input.</a:t>
+            </a:r>
+          </a:p>
+          <a:p>
+            <a:r>
+              <a:rPr lang="en-US" dirty="0"/>
+              <a:t>Part of </a:t>
+            </a:r>
+            <a:r>
+              <a:rPr lang="en-US" dirty="0" err="1"/>
               <a:t>bioconductor</a:t>
             </a:r>
-            <a:r>
-              <a:rPr lang="en-US" dirty="0" smtClean="0"/>
-              <a:t> </a:t>
-            </a:r>
-            <a:r>
-              <a:rPr lang="en-US" dirty="0"/>
-              <a:t>downloads.</a:t>
-            </a:r>
-          </a:p>
-          <a:p>
-            <a:r>
-              <a:rPr lang="en-US" dirty="0" smtClean="0"/>
-              <a:t>The </a:t>
-            </a:r>
-            <a:r>
-              <a:rPr lang="en-US" dirty="0"/>
-              <a:t>package is regularly updated with improvements, bug fixes, etc.</a:t>
-            </a:r>
-          </a:p>
-          <a:p>
-            <a:r>
-              <a:rPr lang="en-US" dirty="0" smtClean="0"/>
-              <a:t>The </a:t>
-            </a:r>
-            <a:r>
-              <a:rPr lang="en-US" dirty="0"/>
-              <a:t>package is maintained by the </a:t>
-            </a:r>
-            <a:r>
-              <a:rPr lang="en-US" dirty="0" smtClean="0"/>
-              <a:t>Griffith lab.</a:t>
-            </a:r>
+            <a:endParaRPr lang="en-US" dirty="0"/>
+          </a:p>
+          <a:p>
+            <a:pPr lvl="1"/>
+            <a:r>
+              <a:rPr lang="en-US" dirty="0">
+                <a:hlinkClick r:id="rId2"/>
+              </a:rPr>
+              <a:t>https://www.bioconductor.org/packages/3.3/bioc/html/GenVisR.html</a:t>
+            </a:r>
+            <a:endParaRPr lang="en-US" dirty="0"/>
+          </a:p>
+          <a:p>
+            <a:r>
+              <a:rPr lang="en-US" dirty="0"/>
+              <a:t>Active development on </a:t>
+            </a:r>
+            <a:r>
+              <a:rPr lang="en-US" dirty="0" err="1"/>
+              <a:t>github</a:t>
+            </a:r>
+            <a:endParaRPr lang="en-US" dirty="0"/>
+          </a:p>
+          <a:p>
+            <a:pPr lvl="1"/>
+            <a:r>
+              <a:rPr lang="en-US" dirty="0">
+                <a:hlinkClick r:id="rId3"/>
+              </a:rPr>
+              <a:t>https://github.com/griffithlab/GenVisR</a:t>
+            </a:r>
+            <a:endParaRPr lang="en-US" dirty="0"/>
+          </a:p>
+          <a:p>
+            <a:r>
+              <a:rPr lang="en-US" dirty="0"/>
+              <a:t>Functions focused in three areas “Small variants”, “Copy number alterations”, and “Data quality”</a:t>
+            </a:r>
+          </a:p>
+          <a:p>
             <a:endParaRPr lang="en-US" dirty="0"/>
           </a:p>
         </p:txBody>
@@ -5215,7 +5286,7 @@
     </p:spTree>
     <p:extLst>
       <p:ext uri="{BB962C8B-B14F-4D97-AF65-F5344CB8AC3E}">
-        <p14:creationId xmlns:p14="http://schemas.microsoft.com/office/powerpoint/2010/main" val="4184394177"/>
+        <p14:creationId xmlns:p14="http://schemas.microsoft.com/office/powerpoint/2010/main" val="1023695290"/>
       </p:ext>
     </p:extLst>
   </p:cSld>
@@ -5258,14 +5329,17 @@
           <a:lstStyle/>
           <a:p>
             <a:r>
-              <a:rPr lang="en-US" dirty="0" err="1" smtClean="0"/>
+              <a:rPr lang="en-US" dirty="0"/>
+              <a:t>Why </a:t>
+            </a:r>
+            <a:r>
+              <a:rPr lang="en-US" dirty="0" err="1"/>
               <a:t>GenVisR</a:t>
             </a:r>
             <a:r>
-              <a:rPr lang="en-US" dirty="0" smtClean="0"/>
-              <a:t>::waterfall()</a:t>
-            </a:r>
-            <a:endParaRPr lang="en-US" dirty="0"/>
+              <a:rPr lang="en-US" dirty="0"/>
+              <a:t>?</a:t>
+            </a:r>
           </a:p>
         </p:txBody>
       </p:sp>
@@ -5286,73 +5360,47 @@
           <a:p>
             <a:r>
               <a:rPr lang="en-US" dirty="0"/>
-              <a:t>What does it do?</a:t>
-            </a:r>
-          </a:p>
-          <a:p>
-            <a:pPr lvl="1"/>
-            <a:r>
-              <a:rPr lang="en-US" dirty="0"/>
-              <a:t>Visualize the types of mutations within a cohort</a:t>
-            </a:r>
-          </a:p>
-          <a:p>
-            <a:pPr lvl="1"/>
-            <a:r>
-              <a:rPr lang="en-US" dirty="0"/>
-              <a:t>Visualize the mutation burden in a data set</a:t>
-            </a:r>
-          </a:p>
-          <a:p>
-            <a:pPr lvl="1"/>
-            <a:r>
-              <a:rPr lang="en-US" dirty="0"/>
-              <a:t>Visualize the proportion of samples with a mutated gene</a:t>
-            </a:r>
-          </a:p>
-          <a:p>
-            <a:pPr lvl="1"/>
-            <a:r>
-              <a:rPr lang="en-US" dirty="0"/>
-              <a:t>Visualize clinical data</a:t>
-            </a:r>
-          </a:p>
-          <a:p>
-            <a:r>
-              <a:rPr lang="en-US" dirty="0"/>
-              <a:t>Why do we care?</a:t>
-            </a:r>
-          </a:p>
-          <a:p>
-            <a:pPr lvl="1"/>
-            <a:r>
-              <a:rPr lang="en-US" dirty="0"/>
-              <a:t>Determine mutually exclusive or co-occurring genomic events</a:t>
-            </a:r>
-          </a:p>
-          <a:p>
-            <a:pPr lvl="1"/>
-            <a:r>
-              <a:rPr lang="en-US" dirty="0"/>
-              <a:t>Recognize patterns within clinical data</a:t>
-            </a:r>
-          </a:p>
-          <a:p>
-            <a:pPr lvl="1"/>
-            <a:r>
-              <a:rPr lang="en-US" dirty="0"/>
-              <a:t>See if the mutation burden conforms to expectations</a:t>
-            </a:r>
-          </a:p>
-          <a:p>
-            <a:endParaRPr lang="en-US" dirty="0"/>
+              <a:t>The package is built upon ggplot2 and will allow us to leverage information we've learned in previous modules.</a:t>
+            </a:r>
+          </a:p>
+          <a:p>
+            <a:r>
+              <a:rPr lang="en-US" dirty="0"/>
+              <a:t>The package is intended to be flexible, supporting multiple file types, species, etc.</a:t>
+            </a:r>
+          </a:p>
+          <a:p>
+            <a:r>
+              <a:rPr lang="en-US" dirty="0"/>
+              <a:t>The package is relatively popular; In the top 20% of </a:t>
+            </a:r>
+            <a:r>
+              <a:rPr lang="en-US" dirty="0" err="1"/>
+              <a:t>bioconductor</a:t>
+            </a:r>
+            <a:r>
+              <a:rPr lang="en-US" dirty="0"/>
+              <a:t> downloads.</a:t>
+            </a:r>
+          </a:p>
+          <a:p>
+            <a:r>
+              <a:rPr lang="en-US" dirty="0"/>
+              <a:t>The package is regularly updated with improvements, bug fixes, etc.</a:t>
+            </a:r>
+          </a:p>
+          <a:p>
+            <a:r>
+              <a:rPr lang="en-US" dirty="0"/>
+              <a:t>The package is maintained by the Griffith lab.</a:t>
+            </a:r>
           </a:p>
         </p:txBody>
       </p:sp>
     </p:spTree>
     <p:extLst>
       <p:ext uri="{BB962C8B-B14F-4D97-AF65-F5344CB8AC3E}">
-        <p14:creationId xmlns:p14="http://schemas.microsoft.com/office/powerpoint/2010/main" val="2649635689"/>
+        <p14:creationId xmlns:p14="http://schemas.microsoft.com/office/powerpoint/2010/main" val="4184394177"/>
       </p:ext>
     </p:extLst>
   </p:cSld>
@@ -5395,84 +5443,92 @@
           <a:lstStyle/>
           <a:p>
             <a:r>
-              <a:rPr lang="en-US" dirty="0" err="1" smtClean="0"/>
+              <a:rPr lang="en-US" dirty="0" err="1"/>
               <a:t>GenVisR</a:t>
             </a:r>
             <a:r>
-              <a:rPr lang="en-US" dirty="0" smtClean="0"/>
+              <a:rPr lang="en-US" dirty="0"/>
               <a:t>::waterfall()</a:t>
             </a:r>
-            <a:endParaRPr lang="en-US" dirty="0"/>
-          </a:p>
-        </p:txBody>
-      </p:sp>
-      <p:pic>
-        <p:nvPicPr>
-          <p:cNvPr id="6" name="Content Placeholder 5" descr="tmp.png"/>
-          <p:cNvPicPr>
-            <a:picLocks noGrp="1" noChangeAspect="1"/>
-          </p:cNvPicPr>
+          </a:p>
+        </p:txBody>
+      </p:sp>
+      <p:sp>
+        <p:nvSpPr>
+          <p:cNvPr id="3" name="Content Placeholder 2"/>
+          <p:cNvSpPr>
+            <a:spLocks noGrp="1"/>
+          </p:cNvSpPr>
           <p:nvPr>
             <p:ph idx="1"/>
           </p:nvPr>
-        </p:nvPicPr>
-        <p:blipFill>
-          <a:blip r:embed="rId3">
-            <a:extLst>
-              <a:ext uri="{28A0092B-C50C-407E-A947-70E740481C1C}">
-                <a14:useLocalDpi xmlns:a14="http://schemas.microsoft.com/office/drawing/2010/main" val="0"/>
-              </a:ext>
-            </a:extLst>
-          </a:blip>
-          <a:srcRect l="-29612" r="-29612"/>
-          <a:stretch>
-            <a:fillRect/>
-          </a:stretch>
-        </p:blipFill>
+        </p:nvSpPr>
         <p:spPr/>
-      </p:pic>
-      <p:sp>
-        <p:nvSpPr>
-          <p:cNvPr id="7" name="TextBox 6"/>
-          <p:cNvSpPr txBox="1"/>
-          <p:nvPr/>
-        </p:nvSpPr>
-        <p:spPr>
-          <a:xfrm>
-            <a:off x="226785" y="6240193"/>
-            <a:ext cx="8235600" cy="369332"/>
-          </a:xfrm>
-          <a:prstGeom prst="rect">
-            <a:avLst/>
-          </a:prstGeom>
-          <a:noFill/>
-        </p:spPr>
-        <p:txBody>
-          <a:bodyPr wrap="square" rtlCol="0">
-            <a:spAutoFit/>
-          </a:bodyPr>
+        <p:txBody>
+          <a:bodyPr/>
           <a:lstStyle/>
           <a:p>
             <a:r>
-              <a:rPr lang="en-US" dirty="0" smtClean="0"/>
-              <a:t>Fig. 2</a:t>
-            </a:r>
-            <a:r>
-              <a:rPr lang="en-US" dirty="0"/>
-              <a:t>: “</a:t>
-            </a:r>
-            <a:r>
-              <a:rPr lang="en-US" dirty="0" err="1"/>
-              <a:t>DGIdb</a:t>
-            </a:r>
-            <a:r>
-              <a:rPr lang="en-US" dirty="0"/>
-              <a:t> 2.0: mining clinically relevant drug–gene </a:t>
-            </a:r>
-            <a:r>
-              <a:rPr lang="en-US" dirty="0" smtClean="0"/>
-              <a:t>interactions”</a:t>
-            </a:r>
+              <a:rPr lang="en-US" dirty="0"/>
+              <a:t>What does it do?</a:t>
+            </a:r>
+          </a:p>
+          <a:p>
+            <a:pPr lvl="1"/>
+            <a:r>
+              <a:rPr lang="en-US" dirty="0"/>
+              <a:t>Visualize the types of mutations within a cohort</a:t>
+            </a:r>
+          </a:p>
+          <a:p>
+            <a:pPr lvl="1"/>
+            <a:r>
+              <a:rPr lang="en-US" dirty="0"/>
+              <a:t>Visualize the mutation burden in a data set</a:t>
+            </a:r>
+          </a:p>
+          <a:p>
+            <a:pPr lvl="1"/>
+            <a:r>
+              <a:rPr lang="en-US" dirty="0"/>
+              <a:t>Visualize the proportion of samples with a mutated gene</a:t>
+            </a:r>
+          </a:p>
+          <a:p>
+            <a:pPr lvl="1"/>
+            <a:r>
+              <a:rPr lang="en-US" dirty="0"/>
+              <a:t>Visualize clinical data</a:t>
+            </a:r>
+          </a:p>
+          <a:p>
+            <a:r>
+              <a:rPr lang="en-US" dirty="0"/>
+              <a:t>Why do we care?</a:t>
+            </a:r>
+          </a:p>
+          <a:p>
+            <a:pPr lvl="1"/>
+            <a:r>
+              <a:rPr lang="en-US" dirty="0"/>
+              <a:t>Determine mutually exclusive or co-occurring genomic events</a:t>
+            </a:r>
+          </a:p>
+          <a:p>
+            <a:pPr lvl="1"/>
+            <a:r>
+              <a:rPr lang="en-US" dirty="0"/>
+              <a:t>Recognize patterns within clinical data</a:t>
+            </a:r>
+          </a:p>
+          <a:p>
+            <a:pPr lvl="1"/>
+            <a:r>
+              <a:rPr lang="en-US" dirty="0"/>
+              <a:t>See if the mutation burden conforms to expectations</a:t>
+            </a:r>
+          </a:p>
+          <a:p>
             <a:endParaRPr lang="en-US" dirty="0"/>
           </a:p>
         </p:txBody>
@@ -5480,7 +5536,7 @@
     </p:spTree>
     <p:extLst>
       <p:ext uri="{BB962C8B-B14F-4D97-AF65-F5344CB8AC3E}">
-        <p14:creationId xmlns:p14="http://schemas.microsoft.com/office/powerpoint/2010/main" val="3045472521"/>
+        <p14:creationId xmlns:p14="http://schemas.microsoft.com/office/powerpoint/2010/main" val="2649635689"/>
       </p:ext>
     </p:extLst>
   </p:cSld>
@@ -5523,128 +5579,82 @@
           <a:lstStyle/>
           <a:p>
             <a:r>
-              <a:rPr lang="en-US" dirty="0" err="1" smtClean="0"/>
+              <a:rPr lang="en-US" dirty="0" err="1"/>
               <a:t>GenVisR</a:t>
             </a:r>
             <a:r>
-              <a:rPr lang="en-US" dirty="0" smtClean="0"/>
-              <a:t>::</a:t>
-            </a:r>
-            <a:r>
-              <a:rPr lang="en-US" dirty="0" err="1" smtClean="0"/>
-              <a:t>TvTi</a:t>
-            </a:r>
-            <a:r>
-              <a:rPr lang="en-US" dirty="0" smtClean="0"/>
-              <a:t>()</a:t>
-            </a:r>
-            <a:endParaRPr lang="en-US" dirty="0"/>
-          </a:p>
-        </p:txBody>
-      </p:sp>
-      <p:sp>
-        <p:nvSpPr>
-          <p:cNvPr id="3" name="Content Placeholder 2"/>
-          <p:cNvSpPr>
-            <a:spLocks noGrp="1"/>
-          </p:cNvSpPr>
+              <a:rPr lang="en-US" dirty="0"/>
+              <a:t>::waterfall()</a:t>
+            </a:r>
+          </a:p>
+        </p:txBody>
+      </p:sp>
+      <p:pic>
+        <p:nvPicPr>
+          <p:cNvPr id="6" name="Content Placeholder 5" descr="tmp.png"/>
+          <p:cNvPicPr>
+            <a:picLocks noGrp="1" noChangeAspect="1"/>
+          </p:cNvPicPr>
           <p:nvPr>
             <p:ph idx="1"/>
           </p:nvPr>
-        </p:nvSpPr>
+        </p:nvPicPr>
+        <p:blipFill>
+          <a:blip r:embed="rId3">
+            <a:extLst>
+              <a:ext uri="{28A0092B-C50C-407E-A947-70E740481C1C}">
+                <a14:useLocalDpi xmlns:a14="http://schemas.microsoft.com/office/drawing/2010/main" val="0"/>
+              </a:ext>
+            </a:extLst>
+          </a:blip>
+          <a:srcRect l="-29612" r="-29612"/>
+          <a:stretch>
+            <a:fillRect/>
+          </a:stretch>
+        </p:blipFill>
         <p:spPr/>
-        <p:txBody>
-          <a:bodyPr/>
+      </p:pic>
+      <p:sp>
+        <p:nvSpPr>
+          <p:cNvPr id="7" name="TextBox 6"/>
+          <p:cNvSpPr txBox="1"/>
+          <p:nvPr/>
+        </p:nvSpPr>
+        <p:spPr>
+          <a:xfrm>
+            <a:off x="226785" y="6240193"/>
+            <a:ext cx="8235600" cy="369332"/>
+          </a:xfrm>
+          <a:prstGeom prst="rect">
+            <a:avLst/>
+          </a:prstGeom>
+          <a:noFill/>
+        </p:spPr>
+        <p:txBody>
+          <a:bodyPr wrap="square" rtlCol="0">
+            <a:spAutoFit/>
+          </a:bodyPr>
           <a:lstStyle/>
           <a:p>
             <a:r>
               <a:rPr lang="en-US" dirty="0"/>
-              <a:t>What does it do?</a:t>
-            </a:r>
-          </a:p>
-          <a:p>
-            <a:pPr lvl="1"/>
-            <a:r>
-              <a:rPr lang="en-US" dirty="0"/>
-              <a:t>Visualize Transition and </a:t>
+              <a:t>Fig. 2: “</a:t>
             </a:r>
             <a:r>
               <a:rPr lang="en-US" dirty="0" err="1"/>
-              <a:t>Transversion</a:t>
-            </a:r>
-            <a:r>
-              <a:rPr lang="en-US" dirty="0"/>
-              <a:t> proportions</a:t>
-            </a:r>
-          </a:p>
-          <a:p>
-            <a:pPr lvl="1"/>
-            <a:r>
-              <a:rPr lang="en-US" dirty="0"/>
-              <a:t>Visualize Transition and </a:t>
-            </a:r>
-            <a:r>
-              <a:rPr lang="en-US" dirty="0" err="1"/>
-              <a:t>Transversion</a:t>
-            </a:r>
-            <a:r>
-              <a:rPr lang="en-US" dirty="0"/>
-              <a:t> frequencies</a:t>
-            </a:r>
-          </a:p>
-          <a:p>
-            <a:pPr lvl="1"/>
-            <a:r>
-              <a:rPr lang="en-US" dirty="0"/>
-              <a:t>Compare these proportions with expectations</a:t>
-            </a:r>
-          </a:p>
-          <a:p>
-            <a:r>
-              <a:rPr lang="en-US" dirty="0"/>
-              <a:t>Why do we care?</a:t>
-            </a:r>
-          </a:p>
-          <a:p>
-            <a:pPr lvl="1"/>
-            <a:r>
-              <a:rPr lang="en-US" dirty="0"/>
-              <a:t>Visualize mutation profile patterns</a:t>
-            </a:r>
-          </a:p>
-          <a:p>
-            <a:pPr lvl="2"/>
-            <a:r>
-              <a:rPr lang="en-US" dirty="0"/>
-              <a:t>Ex. Smoking tends to increase G -&gt; T/C -&gt; A </a:t>
-            </a:r>
-            <a:r>
-              <a:rPr lang="en-US" dirty="0" err="1"/>
-              <a:t>transversions</a:t>
-            </a:r>
-            <a:r>
-              <a:rPr lang="en-US" dirty="0"/>
-              <a:t> due to oxidative damage</a:t>
-            </a:r>
-          </a:p>
-          <a:p>
-            <a:pPr lvl="2"/>
-            <a:r>
-              <a:rPr lang="en-US" dirty="0"/>
-              <a:t>Practical application verify smoking status of patients with lung </a:t>
-            </a:r>
-            <a:r>
-              <a:rPr lang="en-US" dirty="0" smtClean="0"/>
-              <a:t>carcinomas</a:t>
-            </a:r>
-            <a:endParaRPr lang="en-US" dirty="0"/>
+              <a:t>DGIdb</a:t>
+            </a:r>
+            <a:r>
+              <a:rPr lang="en-US" dirty="0"/>
+              <a:t> 2.0: mining clinically relevant drug–gene interactions”</a:t>
+            </a:r>
           </a:p>
         </p:txBody>
       </p:sp>
     </p:spTree>
     <p:extLst>
       <p:ext uri="{BB962C8B-B14F-4D97-AF65-F5344CB8AC3E}">
-        <p14:creationId xmlns:p14="http://schemas.microsoft.com/office/powerpoint/2010/main" val="2477007331"/>
+        <p14:creationId xmlns:p14="http://schemas.microsoft.com/office/powerpoint/2010/main" val="3045472521"/>
       </p:ext>
     </p:extLst>
   </p:cSld>
@@ -5687,91 +5697,114 @@
           <a:lstStyle/>
           <a:p>
             <a:r>
-              <a:rPr lang="en-US" dirty="0" err="1" smtClean="0"/>
+              <a:rPr lang="en-US" dirty="0" err="1"/>
               <a:t>GenVisR</a:t>
             </a:r>
             <a:r>
-              <a:rPr lang="en-US" dirty="0" smtClean="0"/>
+              <a:rPr lang="en-US" dirty="0"/>
               <a:t>::</a:t>
             </a:r>
             <a:r>
-              <a:rPr lang="en-US" dirty="0" err="1" smtClean="0"/>
+              <a:rPr lang="en-US" dirty="0" err="1"/>
               <a:t>TvTi</a:t>
             </a:r>
             <a:r>
-              <a:rPr lang="en-US" dirty="0" smtClean="0"/>
+              <a:rPr lang="en-US" dirty="0"/>
               <a:t>()</a:t>
             </a:r>
-            <a:endParaRPr lang="en-US" dirty="0"/>
-          </a:p>
-        </p:txBody>
-      </p:sp>
-      <p:pic>
-        <p:nvPicPr>
-          <p:cNvPr id="10" name="Content Placeholder 9" descr="transition_transversion_v4.png"/>
-          <p:cNvPicPr>
-            <a:picLocks noGrp="1" noChangeAspect="1"/>
-          </p:cNvPicPr>
+          </a:p>
+        </p:txBody>
+      </p:sp>
+      <p:sp>
+        <p:nvSpPr>
+          <p:cNvPr id="3" name="Content Placeholder 2"/>
+          <p:cNvSpPr>
+            <a:spLocks noGrp="1"/>
+          </p:cNvSpPr>
           <p:nvPr>
             <p:ph idx="1"/>
           </p:nvPr>
-        </p:nvPicPr>
-        <p:blipFill>
-          <a:blip r:embed="rId3">
-            <a:extLst>
-              <a:ext uri="{28A0092B-C50C-407E-A947-70E740481C1C}">
-                <a14:useLocalDpi xmlns:a14="http://schemas.microsoft.com/office/drawing/2010/main" val="0"/>
-              </a:ext>
-            </a:extLst>
-          </a:blip>
-          <a:srcRect t="-9295" b="-9295"/>
-          <a:stretch>
-            <a:fillRect/>
-          </a:stretch>
-        </p:blipFill>
+        </p:nvSpPr>
         <p:spPr/>
-      </p:pic>
-      <p:sp>
-        <p:nvSpPr>
-          <p:cNvPr id="11" name="TextBox 10"/>
-          <p:cNvSpPr txBox="1"/>
-          <p:nvPr/>
-        </p:nvSpPr>
-        <p:spPr>
-          <a:xfrm>
-            <a:off x="0" y="6136722"/>
-            <a:ext cx="8862786" cy="584776"/>
-          </a:xfrm>
-          <a:prstGeom prst="rect">
-            <a:avLst/>
-          </a:prstGeom>
-          <a:noFill/>
-        </p:spPr>
-        <p:txBody>
-          <a:bodyPr wrap="square" rtlCol="0">
-            <a:spAutoFit/>
-          </a:bodyPr>
+        <p:txBody>
+          <a:bodyPr/>
           <a:lstStyle/>
           <a:p>
             <a:r>
-              <a:rPr lang="en-US" sz="1600" dirty="0"/>
-              <a:t>This research was originally published in Blood. </a:t>
-            </a:r>
-            <a:r>
-              <a:rPr lang="en-US" sz="1600" dirty="0" err="1"/>
-              <a:t>Krysiak</a:t>
-            </a:r>
-            <a:r>
-              <a:rPr lang="en-US" sz="1600" dirty="0"/>
-              <a:t> et al. Blood 2017 129:473-483 by </a:t>
-            </a:r>
-            <a:r>
-              <a:rPr lang="en-US" sz="1600" dirty="0" err="1"/>
-              <a:t>Krysiak</a:t>
-            </a:r>
-            <a:r>
-              <a:rPr lang="en-US" sz="1600" dirty="0"/>
-              <a:t> et al. licensed under © the American Society of Hematology</a:t>
+              <a:rPr lang="en-US" dirty="0"/>
+              <a:t>What does it do?</a:t>
+            </a:r>
+          </a:p>
+          <a:p>
+            <a:pPr lvl="1"/>
+            <a:r>
+              <a:rPr lang="en-US" dirty="0"/>
+              <a:t>Visualize Transition and </a:t>
+            </a:r>
+            <a:r>
+              <a:rPr lang="en-US" dirty="0" err="1"/>
+              <a:t>Transversion</a:t>
+            </a:r>
+            <a:r>
+              <a:rPr lang="en-US" dirty="0"/>
+              <a:t> proportions</a:t>
+            </a:r>
+          </a:p>
+          <a:p>
+            <a:pPr lvl="1"/>
+            <a:r>
+              <a:rPr lang="en-US" dirty="0"/>
+              <a:t>Visualize Transition and </a:t>
+            </a:r>
+            <a:r>
+              <a:rPr lang="en-US" dirty="0" err="1"/>
+              <a:t>Transversion</a:t>
+            </a:r>
+            <a:r>
+              <a:rPr lang="en-US" dirty="0"/>
+              <a:t> frequencies</a:t>
+            </a:r>
+          </a:p>
+          <a:p>
+            <a:pPr lvl="1"/>
+            <a:r>
+              <a:rPr lang="en-US" dirty="0"/>
+              <a:t>Compare these proportions with expectations</a:t>
+            </a:r>
+          </a:p>
+          <a:p>
+            <a:r>
+              <a:rPr lang="en-US" dirty="0"/>
+              <a:t>Why do we care?</a:t>
+            </a:r>
+          </a:p>
+          <a:p>
+            <a:pPr lvl="1"/>
+            <a:r>
+              <a:rPr lang="en-US" dirty="0"/>
+              <a:t>Visualize mutation profile patterns</a:t>
+            </a:r>
+          </a:p>
+          <a:p>
+            <a:pPr lvl="2"/>
+            <a:r>
+              <a:rPr lang="en-US" dirty="0"/>
+              <a:t>Ex. Smoking tends to increase G -&gt; T/C -&gt; A </a:t>
+            </a:r>
+            <a:r>
+              <a:rPr lang="en-US" dirty="0" err="1"/>
+              <a:t>transversions</a:t>
+            </a:r>
+            <a:r>
+              <a:rPr lang="en-US" dirty="0"/>
+              <a:t> due to oxidative damage</a:t>
+            </a:r>
+          </a:p>
+          <a:p>
+            <a:pPr lvl="2"/>
+            <a:r>
+              <a:rPr lang="en-US" dirty="0"/>
+              <a:t>Practical application verify smoking status of patients with lung carcinomas</a:t>
             </a:r>
           </a:p>
         </p:txBody>
@@ -5779,7 +5812,7 @@
     </p:spTree>
     <p:extLst>
       <p:ext uri="{BB962C8B-B14F-4D97-AF65-F5344CB8AC3E}">
-        <p14:creationId xmlns:p14="http://schemas.microsoft.com/office/powerpoint/2010/main" val="1887192775"/>
+        <p14:creationId xmlns:p14="http://schemas.microsoft.com/office/powerpoint/2010/main" val="2477007331"/>
       </p:ext>
     </p:extLst>
   </p:cSld>
@@ -6050,7 +6083,7 @@
   <a:extraClrSchemeLst/>
   <a:extLst>
     <a:ext uri="{05A4C25C-085E-4340-85A3-A5531E510DB2}">
-      <thm15:themeFamily xmlns:thm15="http://schemas.microsoft.com/office/thememl/2012/main" xmlns="" name="MGI_4-3_ratio_v1a" id="{9A0171FA-20F4-F840-B1C8-29D686AB0540}" vid="{60506783-C923-7847-B1CA-7C860CC95497}"/>
+      <thm15:themeFamily xmlns:thm15="http://schemas.microsoft.com/office/thememl/2012/main" name="MGI_4-3_ratio_v1a" id="{9A0171FA-20F4-F840-B1C8-29D686AB0540}" vid="{60506783-C923-7847-B1CA-7C860CC95497}"/>
     </a:ext>
   </a:extLst>
 </a:theme>

</xml_diff>